<commit_message>
updated powerpoint with new cover page
</commit_message>
<xml_diff>
--- a/presentation/UC Berkeley Gym Attendance.pptx
+++ b/presentation/UC Berkeley Gym Attendance.pptx
@@ -5,16 +5,18 @@
     <p:sldMasterId id="2147483648" r:id="rId1"/>
   </p:sldMasterIdLst>
   <p:sldIdLst>
-    <p:sldId id="266" r:id="rId2"/>
-    <p:sldId id="265" r:id="rId3"/>
-    <p:sldId id="263" r:id="rId4"/>
-    <p:sldId id="257" r:id="rId5"/>
-    <p:sldId id="258" r:id="rId6"/>
-    <p:sldId id="259" r:id="rId7"/>
-    <p:sldId id="260" r:id="rId8"/>
-    <p:sldId id="261" r:id="rId9"/>
-    <p:sldId id="262" r:id="rId10"/>
-    <p:sldId id="264" r:id="rId11"/>
+    <p:sldId id="268" r:id="rId2"/>
+    <p:sldId id="269" r:id="rId3"/>
+    <p:sldId id="267" r:id="rId4"/>
+    <p:sldId id="265" r:id="rId5"/>
+    <p:sldId id="263" r:id="rId6"/>
+    <p:sldId id="257" r:id="rId7"/>
+    <p:sldId id="258" r:id="rId8"/>
+    <p:sldId id="259" r:id="rId9"/>
+    <p:sldId id="260" r:id="rId10"/>
+    <p:sldId id="261" r:id="rId11"/>
+    <p:sldId id="262" r:id="rId12"/>
+    <p:sldId id="264" r:id="rId13"/>
   </p:sldIdLst>
   <p:sldSz cx="12192000" cy="6858000"/>
   <p:notesSz cx="6858000" cy="9144000"/>
@@ -2957,22 +2959,54 @@
           <a:chExt cx="0" cy="0"/>
         </a:xfrm>
       </p:grpSpPr>
-      <p:sp>
-        <p:nvSpPr>
-          <p:cNvPr id="5" name="Rectangle 4"/>
+      <p:pic>
+        <p:nvPicPr>
+          <p:cNvPr id="9" name="Picture 8"/>
+          <p:cNvPicPr>
+            <a:picLocks noChangeAspect="1"/>
+          </p:cNvPicPr>
+          <p:nvPr/>
+        </p:nvPicPr>
+        <p:blipFill>
+          <a:blip r:embed="rId2">
+            <a:extLst>
+              <a:ext uri="{28A0092B-C50C-407E-A947-70E740481C1C}">
+                <a14:useLocalDpi xmlns:a14="http://schemas.microsoft.com/office/drawing/2010/main" val="0"/>
+              </a:ext>
+            </a:extLst>
+          </a:blip>
+          <a:stretch>
+            <a:fillRect/>
+          </a:stretch>
+        </p:blipFill>
+        <p:spPr>
+          <a:xfrm>
+            <a:off x="-2320464" y="0"/>
+            <a:ext cx="16566229" cy="5425440"/>
+          </a:xfrm>
+          <a:prstGeom prst="rect">
+            <a:avLst/>
+          </a:prstGeom>
+        </p:spPr>
+      </p:pic>
+      <p:sp>
+        <p:nvSpPr>
+          <p:cNvPr id="13" name="Rectangle 12"/>
           <p:cNvSpPr/>
           <p:nvPr/>
         </p:nvSpPr>
         <p:spPr>
           <a:xfrm>
-            <a:off x="0" y="0"/>
-            <a:ext cx="12192000" cy="897622"/>
+            <a:off x="0" y="1699230"/>
+            <a:ext cx="4152900" cy="2209800"/>
           </a:xfrm>
           <a:prstGeom prst="rect">
             <a:avLst/>
           </a:prstGeom>
           <a:solidFill>
-            <a:srgbClr val="003A70"/>
+            <a:srgbClr val="003A70">
+              <a:alpha val="85000"/>
+            </a:srgbClr>
           </a:solidFill>
           <a:ln>
             <a:noFill/>
@@ -2999,20 +3033,20 @@
           <a:lstStyle/>
           <a:p>
             <a:pPr algn="ctr"/>
-            <a:endParaRPr lang="en-US"/>
-          </a:p>
-        </p:txBody>
-      </p:sp>
-      <p:sp>
-        <p:nvSpPr>
-          <p:cNvPr id="4" name="TextBox 3"/>
+            <a:endParaRPr lang="en-US" dirty="0"/>
+          </a:p>
+        </p:txBody>
+      </p:sp>
+      <p:sp>
+        <p:nvSpPr>
+          <p:cNvPr id="14" name="TextBox 13"/>
           <p:cNvSpPr txBox="1"/>
           <p:nvPr/>
         </p:nvSpPr>
         <p:spPr>
           <a:xfrm>
-            <a:off x="351563" y="125645"/>
-            <a:ext cx="7166837" cy="646331"/>
+            <a:off x="590550" y="2019300"/>
+            <a:ext cx="2667000" cy="1569660"/>
           </a:xfrm>
           <a:prstGeom prst="rect">
             <a:avLst/>
@@ -3026,14 +3060,56 @@
           <a:lstStyle/>
           <a:p>
             <a:r>
-              <a:rPr lang="en-US" sz="3600" dirty="0">
+              <a:rPr lang="en-US" sz="3200" dirty="0">
                 <a:solidFill>
-                  <a:schemeClr val="bg1"/>
+                  <a:schemeClr val="bg1">
+                    <a:lumMod val="95000"/>
+                  </a:schemeClr>
                 </a:solidFill>
                 <a:latin typeface="Proxima Nova Lt" panose="02000506030000020004" pitchFamily="50" charset="0"/>
+              </a:rPr>
+              <a:t>How Many People Are in the Gym?</a:t>
+            </a:r>
+          </a:p>
+        </p:txBody>
+      </p:sp>
+      <p:sp>
+        <p:nvSpPr>
+          <p:cNvPr id="18" name="TextBox 17"/>
+          <p:cNvSpPr txBox="1"/>
+          <p:nvPr/>
+        </p:nvSpPr>
+        <p:spPr>
+          <a:xfrm>
+            <a:off x="10439400" y="5772150"/>
+            <a:ext cx="1752600" cy="707886"/>
+          </a:xfrm>
+          <a:prstGeom prst="rect">
+            <a:avLst/>
+          </a:prstGeom>
+          <a:noFill/>
+        </p:spPr>
+        <p:txBody>
+          <a:bodyPr wrap="square" rtlCol="0">
+            <a:spAutoFit/>
+          </a:bodyPr>
+          <a:lstStyle/>
+          <a:p>
+            <a:r>
+              <a:rPr lang="en-US" sz="2000" spc="-50" dirty="0">
+                <a:latin typeface="Karla" pitchFamily="2" charset="0"/>
                 <a:ea typeface="Karla" pitchFamily="2" charset="0"/>
               </a:rPr>
-              <a:t>Why?</a:t>
+              <a:t>Jeff Ernst</a:t>
+            </a:r>
+          </a:p>
+          <a:p>
+            <a:r>
+              <a:rPr lang="en-US" sz="2000" spc="-50" dirty="0">
+                <a:latin typeface="Karla" pitchFamily="2" charset="0"/>
+                <a:ea typeface="Karla" pitchFamily="2" charset="0"/>
+              </a:rPr>
+              <a:t>April 2017</a:t>
             </a:r>
           </a:p>
         </p:txBody>
@@ -3041,7 +3117,7 @@
     </p:spTree>
     <p:extLst>
       <p:ext uri="{BB962C8B-B14F-4D97-AF65-F5344CB8AC3E}">
-        <p14:creationId xmlns:p14="http://schemas.microsoft.com/office/powerpoint/2010/main" val="2262752931"/>
+        <p14:creationId xmlns:p14="http://schemas.microsoft.com/office/powerpoint/2010/main" val="3283723802"/>
       </p:ext>
     </p:extLst>
   </p:cSld>
@@ -3142,6 +3218,1562 @@
           <a:prstGeom prst="rect">
             <a:avLst/>
           </a:prstGeom>
+          <a:ln>
+            <a:noFill/>
+          </a:ln>
+        </p:spPr>
+      </p:pic>
+      <p:sp>
+        <p:nvSpPr>
+          <p:cNvPr id="53" name="TextBox 52"/>
+          <p:cNvSpPr txBox="1"/>
+          <p:nvPr/>
+        </p:nvSpPr>
+        <p:spPr>
+          <a:xfrm>
+            <a:off x="5823050" y="6411684"/>
+            <a:ext cx="647934" cy="276999"/>
+          </a:xfrm>
+          <a:prstGeom prst="rect">
+            <a:avLst/>
+          </a:prstGeom>
+          <a:noFill/>
+        </p:spPr>
+        <p:txBody>
+          <a:bodyPr wrap="none" rtlCol="0">
+            <a:spAutoFit/>
+          </a:bodyPr>
+          <a:lstStyle/>
+          <a:p>
+            <a:r>
+              <a:rPr lang="en-US" sz="1200" b="1" dirty="0">
+                <a:latin typeface="Arial" panose="020B0604020202020204" pitchFamily="34" charset="0"/>
+                <a:cs typeface="Arial" panose="020B0604020202020204" pitchFamily="34" charset="0"/>
+              </a:rPr>
+              <a:t>Month</a:t>
+            </a:r>
+            <a:endParaRPr lang="en-US" sz="1400" b="1" dirty="0">
+              <a:latin typeface="Arial" panose="020B0604020202020204" pitchFamily="34" charset="0"/>
+              <a:cs typeface="Arial" panose="020B0604020202020204" pitchFamily="34" charset="0"/>
+            </a:endParaRPr>
+          </a:p>
+        </p:txBody>
+      </p:sp>
+      <p:sp>
+        <p:nvSpPr>
+          <p:cNvPr id="54" name="TextBox 53"/>
+          <p:cNvSpPr txBox="1"/>
+          <p:nvPr/>
+        </p:nvSpPr>
+        <p:spPr>
+          <a:xfrm>
+            <a:off x="6678270" y="1168985"/>
+            <a:ext cx="1994014" cy="851515"/>
+          </a:xfrm>
+          <a:prstGeom prst="rect">
+            <a:avLst/>
+          </a:prstGeom>
+          <a:noFill/>
+        </p:spPr>
+        <p:txBody>
+          <a:bodyPr wrap="square" rtlCol="0">
+            <a:spAutoFit/>
+          </a:bodyPr>
+          <a:lstStyle/>
+          <a:p>
+            <a:pPr>
+              <a:spcAft>
+                <a:spcPts val="100"/>
+              </a:spcAft>
+            </a:pPr>
+            <a:r>
+              <a:rPr lang="en-US" sz="1200" b="1" dirty="0">
+                <a:solidFill>
+                  <a:schemeClr val="bg2">
+                    <a:lumMod val="90000"/>
+                  </a:schemeClr>
+                </a:solidFill>
+                <a:latin typeface="Century Gothic" panose="020B0502020202020204" pitchFamily="34" charset="0"/>
+                <a:cs typeface="Arial" panose="020B0604020202020204" pitchFamily="34" charset="0"/>
+              </a:rPr>
+              <a:t>New Year’s Gym Rush</a:t>
+            </a:r>
+          </a:p>
+          <a:p>
+            <a:pPr>
+              <a:spcAft>
+                <a:spcPts val="200"/>
+              </a:spcAft>
+            </a:pPr>
+            <a:r>
+              <a:rPr lang="en-US" sz="1000" dirty="0">
+                <a:solidFill>
+                  <a:schemeClr val="bg2">
+                    <a:lumMod val="90000"/>
+                  </a:schemeClr>
+                </a:solidFill>
+                <a:latin typeface="Century Gothic" panose="020B0502020202020204" pitchFamily="34" charset="0"/>
+                <a:cs typeface="Arial" panose="020B0604020202020204" pitchFamily="34" charset="0"/>
+              </a:rPr>
+              <a:t>Jan 20, 2016</a:t>
+            </a:r>
+          </a:p>
+          <a:p>
+            <a:r>
+              <a:rPr lang="en-US" sz="800" i="1" dirty="0">
+                <a:solidFill>
+                  <a:schemeClr val="bg2">
+                    <a:lumMod val="90000"/>
+                  </a:schemeClr>
+                </a:solidFill>
+                <a:latin typeface="Century Gothic" panose="020B0502020202020204" pitchFamily="34" charset="0"/>
+                <a:cs typeface="Arial" panose="020B0604020202020204" pitchFamily="34" charset="0"/>
+              </a:rPr>
+              <a:t>Students flood to the gym in a futile attempt to fulfill their New Year’s goals</a:t>
+            </a:r>
+          </a:p>
+        </p:txBody>
+      </p:sp>
+      <p:cxnSp>
+        <p:nvCxnSpPr>
+          <p:cNvPr id="60" name="Straight Arrow Connector 59"/>
+          <p:cNvCxnSpPr>
+            <a:cxnSpLocks/>
+          </p:cNvCxnSpPr>
+          <p:nvPr/>
+        </p:nvCxnSpPr>
+        <p:spPr>
+          <a:xfrm flipH="1">
+            <a:off x="5741759" y="1433497"/>
+            <a:ext cx="974611" cy="33724"/>
+          </a:xfrm>
+          <a:prstGeom prst="straightConnector1">
+            <a:avLst/>
+          </a:prstGeom>
+          <a:ln>
+            <a:solidFill>
+              <a:schemeClr val="bg2"/>
+            </a:solidFill>
+            <a:tailEnd type="triangle"/>
+          </a:ln>
+        </p:spPr>
+        <p:style>
+          <a:lnRef idx="1">
+            <a:schemeClr val="accent1"/>
+          </a:lnRef>
+          <a:fillRef idx="0">
+            <a:schemeClr val="accent1"/>
+          </a:fillRef>
+          <a:effectRef idx="0">
+            <a:schemeClr val="accent1"/>
+          </a:effectRef>
+          <a:fontRef idx="minor">
+            <a:schemeClr val="tx1"/>
+          </a:fontRef>
+        </p:style>
+      </p:cxnSp>
+      <p:cxnSp>
+        <p:nvCxnSpPr>
+          <p:cNvPr id="61" name="Straight Arrow Connector 60"/>
+          <p:cNvCxnSpPr>
+            <a:cxnSpLocks/>
+          </p:cNvCxnSpPr>
+          <p:nvPr/>
+        </p:nvCxnSpPr>
+        <p:spPr>
+          <a:xfrm flipV="1">
+            <a:off x="4584700" y="4626041"/>
+            <a:ext cx="317272" cy="382366"/>
+          </a:xfrm>
+          <a:prstGeom prst="straightConnector1">
+            <a:avLst/>
+          </a:prstGeom>
+          <a:ln>
+            <a:solidFill>
+              <a:schemeClr val="bg2"/>
+            </a:solidFill>
+            <a:tailEnd type="triangle"/>
+          </a:ln>
+        </p:spPr>
+        <p:style>
+          <a:lnRef idx="1">
+            <a:schemeClr val="accent1"/>
+          </a:lnRef>
+          <a:fillRef idx="0">
+            <a:schemeClr val="accent1"/>
+          </a:fillRef>
+          <a:effectRef idx="0">
+            <a:schemeClr val="accent1"/>
+          </a:effectRef>
+          <a:fontRef idx="minor">
+            <a:schemeClr val="tx1"/>
+          </a:fontRef>
+        </p:style>
+      </p:cxnSp>
+      <p:sp>
+        <p:nvSpPr>
+          <p:cNvPr id="64" name="TextBox 63"/>
+          <p:cNvSpPr txBox="1"/>
+          <p:nvPr/>
+        </p:nvSpPr>
+        <p:spPr>
+          <a:xfrm>
+            <a:off x="968375" y="264531"/>
+            <a:ext cx="5178311" cy="461665"/>
+          </a:xfrm>
+          <a:prstGeom prst="rect">
+            <a:avLst/>
+          </a:prstGeom>
+          <a:noFill/>
+        </p:spPr>
+        <p:txBody>
+          <a:bodyPr wrap="square" rtlCol="0">
+            <a:spAutoFit/>
+          </a:bodyPr>
+          <a:lstStyle/>
+          <a:p>
+            <a:r>
+              <a:rPr lang="en-US" sz="2400" dirty="0">
+                <a:latin typeface="Futura-Normal" pitchFamily="2" charset="0"/>
+              </a:rPr>
+              <a:t>UC Berkeley 2015-16 Gym Attendance</a:t>
+            </a:r>
+          </a:p>
+        </p:txBody>
+      </p:sp>
+      <p:sp>
+        <p:nvSpPr>
+          <p:cNvPr id="65" name="TextBox 64"/>
+          <p:cNvSpPr txBox="1"/>
+          <p:nvPr/>
+        </p:nvSpPr>
+        <p:spPr>
+          <a:xfrm>
+            <a:off x="3539744" y="5008407"/>
+            <a:ext cx="1617448" cy="838691"/>
+          </a:xfrm>
+          <a:prstGeom prst="rect">
+            <a:avLst/>
+          </a:prstGeom>
+          <a:noFill/>
+        </p:spPr>
+        <p:txBody>
+          <a:bodyPr wrap="square" rtlCol="0">
+            <a:spAutoFit/>
+          </a:bodyPr>
+          <a:lstStyle/>
+          <a:p>
+            <a:pPr>
+              <a:spcAft>
+                <a:spcPts val="100"/>
+              </a:spcAft>
+            </a:pPr>
+            <a:r>
+              <a:rPr lang="en-US" sz="1200" b="1" dirty="0">
+                <a:solidFill>
+                  <a:schemeClr val="bg2">
+                    <a:lumMod val="90000"/>
+                  </a:schemeClr>
+                </a:solidFill>
+                <a:latin typeface="Century Gothic" panose="020B0502020202020204" pitchFamily="34" charset="0"/>
+                <a:cs typeface="Arial" panose="020B0604020202020204" pitchFamily="34" charset="0"/>
+              </a:rPr>
+              <a:t>Winter Break</a:t>
+            </a:r>
+          </a:p>
+          <a:p>
+            <a:pPr>
+              <a:spcAft>
+                <a:spcPts val="200"/>
+              </a:spcAft>
+            </a:pPr>
+            <a:r>
+              <a:rPr lang="en-US" sz="1000" dirty="0">
+                <a:solidFill>
+                  <a:schemeClr val="bg2">
+                    <a:lumMod val="90000"/>
+                  </a:schemeClr>
+                </a:solidFill>
+                <a:latin typeface="Century Gothic" panose="020B0502020202020204" pitchFamily="34" charset="0"/>
+                <a:cs typeface="Arial" panose="020B0604020202020204" pitchFamily="34" charset="0"/>
+              </a:rPr>
+              <a:t>Dec 19-Jan 19, 2015</a:t>
+            </a:r>
+          </a:p>
+          <a:p>
+            <a:r>
+              <a:rPr lang="en-US" sz="800" i="1" dirty="0">
+                <a:solidFill>
+                  <a:schemeClr val="bg2">
+                    <a:lumMod val="90000"/>
+                  </a:schemeClr>
+                </a:solidFill>
+                <a:latin typeface="Century Gothic" panose="020B0502020202020204" pitchFamily="34" charset="0"/>
+                <a:cs typeface="Arial" panose="020B0604020202020204" pitchFamily="34" charset="0"/>
+              </a:rPr>
+              <a:t>Most students head home for the winter holidays, like Christmas and Hanukkah</a:t>
+            </a:r>
+          </a:p>
+        </p:txBody>
+      </p:sp>
+      <p:sp>
+        <p:nvSpPr>
+          <p:cNvPr id="66" name="TextBox 65"/>
+          <p:cNvSpPr txBox="1"/>
+          <p:nvPr/>
+        </p:nvSpPr>
+        <p:spPr>
+          <a:xfrm>
+            <a:off x="2023091" y="3516084"/>
+            <a:ext cx="1621523" cy="838691"/>
+          </a:xfrm>
+          <a:prstGeom prst="rect">
+            <a:avLst/>
+          </a:prstGeom>
+          <a:noFill/>
+        </p:spPr>
+        <p:txBody>
+          <a:bodyPr wrap="square" rtlCol="0">
+            <a:spAutoFit/>
+          </a:bodyPr>
+          <a:lstStyle/>
+          <a:p>
+            <a:pPr>
+              <a:spcAft>
+                <a:spcPts val="100"/>
+              </a:spcAft>
+            </a:pPr>
+            <a:r>
+              <a:rPr lang="en-US" sz="1200" b="1" dirty="0">
+                <a:solidFill>
+                  <a:schemeClr val="bg2">
+                    <a:lumMod val="90000"/>
+                  </a:schemeClr>
+                </a:solidFill>
+                <a:latin typeface="Century Gothic" panose="020B0502020202020204" pitchFamily="34" charset="0"/>
+                <a:cs typeface="Arial" panose="020B0604020202020204" pitchFamily="34" charset="0"/>
+              </a:rPr>
+              <a:t>Thanksgiving</a:t>
+            </a:r>
+          </a:p>
+          <a:p>
+            <a:pPr>
+              <a:spcAft>
+                <a:spcPts val="200"/>
+              </a:spcAft>
+            </a:pPr>
+            <a:r>
+              <a:rPr lang="en-US" sz="1000" dirty="0">
+                <a:solidFill>
+                  <a:schemeClr val="bg2">
+                    <a:lumMod val="90000"/>
+                  </a:schemeClr>
+                </a:solidFill>
+                <a:latin typeface="Century Gothic" panose="020B0502020202020204" pitchFamily="34" charset="0"/>
+                <a:cs typeface="Arial" panose="020B0604020202020204" pitchFamily="34" charset="0"/>
+              </a:rPr>
+              <a:t>Nov 26 2015</a:t>
+            </a:r>
+          </a:p>
+          <a:p>
+            <a:r>
+              <a:rPr lang="en-US" sz="800" i="1" dirty="0">
+                <a:solidFill>
+                  <a:schemeClr val="bg2">
+                    <a:lumMod val="90000"/>
+                  </a:schemeClr>
+                </a:solidFill>
+                <a:latin typeface="Century Gothic" panose="020B0502020202020204" pitchFamily="34" charset="0"/>
+                <a:cs typeface="Arial" panose="020B0604020202020204" pitchFamily="34" charset="0"/>
+              </a:rPr>
+              <a:t>Working out is optional when you’re filling up on turkey and mashed potatoes</a:t>
+            </a:r>
+          </a:p>
+        </p:txBody>
+      </p:sp>
+      <p:cxnSp>
+        <p:nvCxnSpPr>
+          <p:cNvPr id="67" name="Straight Arrow Connector 66"/>
+          <p:cNvCxnSpPr>
+            <a:cxnSpLocks/>
+          </p:cNvCxnSpPr>
+          <p:nvPr/>
+        </p:nvCxnSpPr>
+        <p:spPr>
+          <a:xfrm flipV="1">
+            <a:off x="3249384" y="3601809"/>
+            <a:ext cx="926306" cy="219076"/>
+          </a:xfrm>
+          <a:prstGeom prst="straightConnector1">
+            <a:avLst/>
+          </a:prstGeom>
+          <a:ln>
+            <a:solidFill>
+              <a:schemeClr val="bg2"/>
+            </a:solidFill>
+            <a:tailEnd type="triangle"/>
+          </a:ln>
+        </p:spPr>
+        <p:style>
+          <a:lnRef idx="1">
+            <a:schemeClr val="accent1"/>
+          </a:lnRef>
+          <a:fillRef idx="0">
+            <a:schemeClr val="accent1"/>
+          </a:fillRef>
+          <a:effectRef idx="0">
+            <a:schemeClr val="accent1"/>
+          </a:effectRef>
+          <a:fontRef idx="minor">
+            <a:schemeClr val="tx1"/>
+          </a:fontRef>
+        </p:style>
+      </p:cxnSp>
+      <p:sp>
+        <p:nvSpPr>
+          <p:cNvPr id="72" name="TextBox 71"/>
+          <p:cNvSpPr txBox="1"/>
+          <p:nvPr/>
+        </p:nvSpPr>
+        <p:spPr>
+          <a:xfrm>
+            <a:off x="5910722" y="5008407"/>
+            <a:ext cx="1535095" cy="592470"/>
+          </a:xfrm>
+          <a:prstGeom prst="rect">
+            <a:avLst/>
+          </a:prstGeom>
+          <a:noFill/>
+        </p:spPr>
+        <p:txBody>
+          <a:bodyPr wrap="square" rtlCol="0">
+            <a:spAutoFit/>
+          </a:bodyPr>
+          <a:lstStyle/>
+          <a:p>
+            <a:pPr>
+              <a:spcAft>
+                <a:spcPts val="100"/>
+              </a:spcAft>
+            </a:pPr>
+            <a:r>
+              <a:rPr lang="en-US" sz="1200" b="1" dirty="0">
+                <a:latin typeface="Century Gothic" panose="020B0502020202020204" pitchFamily="34" charset="0"/>
+                <a:cs typeface="Arial" panose="020B0604020202020204" pitchFamily="34" charset="0"/>
+              </a:rPr>
+              <a:t>Spring Break</a:t>
+            </a:r>
+          </a:p>
+          <a:p>
+            <a:pPr>
+              <a:spcAft>
+                <a:spcPts val="200"/>
+              </a:spcAft>
+            </a:pPr>
+            <a:r>
+              <a:rPr lang="en-US" sz="1000" dirty="0">
+                <a:latin typeface="Century Gothic" panose="020B0502020202020204" pitchFamily="34" charset="0"/>
+                <a:cs typeface="Arial" panose="020B0604020202020204" pitchFamily="34" charset="0"/>
+              </a:rPr>
+              <a:t>Mar 21-25, 2016</a:t>
+            </a:r>
+          </a:p>
+          <a:p>
+            <a:r>
+              <a:rPr lang="en-US" sz="800" i="1" dirty="0">
+                <a:latin typeface="Century Gothic" panose="020B0502020202020204" pitchFamily="34" charset="0"/>
+                <a:cs typeface="Arial" panose="020B0604020202020204" pitchFamily="34" charset="0"/>
+              </a:rPr>
+              <a:t>Spring break! Party! Woo!</a:t>
+            </a:r>
+          </a:p>
+        </p:txBody>
+      </p:sp>
+      <p:cxnSp>
+        <p:nvCxnSpPr>
+          <p:cNvPr id="80" name="Straight Arrow Connector 79"/>
+          <p:cNvCxnSpPr>
+            <a:cxnSpLocks/>
+          </p:cNvCxnSpPr>
+          <p:nvPr/>
+        </p:nvCxnSpPr>
+        <p:spPr>
+          <a:xfrm flipV="1">
+            <a:off x="6934200" y="4354775"/>
+            <a:ext cx="400050" cy="653632"/>
+          </a:xfrm>
+          <a:prstGeom prst="straightConnector1">
+            <a:avLst/>
+          </a:prstGeom>
+          <a:ln>
+            <a:tailEnd type="triangle"/>
+          </a:ln>
+        </p:spPr>
+        <p:style>
+          <a:lnRef idx="1">
+            <a:schemeClr val="accent1"/>
+          </a:lnRef>
+          <a:fillRef idx="0">
+            <a:schemeClr val="accent1"/>
+          </a:fillRef>
+          <a:effectRef idx="0">
+            <a:schemeClr val="accent1"/>
+          </a:effectRef>
+          <a:fontRef idx="minor">
+            <a:schemeClr val="tx1"/>
+          </a:fontRef>
+        </p:style>
+      </p:cxnSp>
+      <p:sp>
+        <p:nvSpPr>
+          <p:cNvPr id="85" name="TextBox 84"/>
+          <p:cNvSpPr txBox="1"/>
+          <p:nvPr/>
+        </p:nvSpPr>
+        <p:spPr>
+          <a:xfrm>
+            <a:off x="3103334" y="1105594"/>
+            <a:ext cx="1481366" cy="715581"/>
+          </a:xfrm>
+          <a:prstGeom prst="rect">
+            <a:avLst/>
+          </a:prstGeom>
+          <a:noFill/>
+        </p:spPr>
+        <p:txBody>
+          <a:bodyPr wrap="square" rtlCol="0">
+            <a:spAutoFit/>
+          </a:bodyPr>
+          <a:lstStyle/>
+          <a:p>
+            <a:pPr>
+              <a:spcAft>
+                <a:spcPts val="100"/>
+              </a:spcAft>
+            </a:pPr>
+            <a:r>
+              <a:rPr lang="en-US" sz="1200" b="1" dirty="0">
+                <a:solidFill>
+                  <a:schemeClr val="bg2">
+                    <a:lumMod val="90000"/>
+                  </a:schemeClr>
+                </a:solidFill>
+                <a:latin typeface="Century Gothic" panose="020B0502020202020204" pitchFamily="34" charset="0"/>
+                <a:cs typeface="Arial" panose="020B0604020202020204" pitchFamily="34" charset="0"/>
+              </a:rPr>
+              <a:t>School Begins</a:t>
+            </a:r>
+          </a:p>
+          <a:p>
+            <a:pPr>
+              <a:spcAft>
+                <a:spcPts val="200"/>
+              </a:spcAft>
+            </a:pPr>
+            <a:r>
+              <a:rPr lang="en-US" sz="1000" dirty="0">
+                <a:solidFill>
+                  <a:schemeClr val="bg2">
+                    <a:lumMod val="90000"/>
+                  </a:schemeClr>
+                </a:solidFill>
+                <a:latin typeface="Century Gothic" panose="020B0502020202020204" pitchFamily="34" charset="0"/>
+                <a:cs typeface="Arial" panose="020B0604020202020204" pitchFamily="34" charset="0"/>
+              </a:rPr>
+              <a:t>Aug 26, 2016</a:t>
+            </a:r>
+          </a:p>
+          <a:p>
+            <a:r>
+              <a:rPr lang="en-US" sz="800" i="1" dirty="0">
+                <a:solidFill>
+                  <a:schemeClr val="bg2">
+                    <a:lumMod val="90000"/>
+                  </a:schemeClr>
+                </a:solidFill>
+                <a:latin typeface="Century Gothic" panose="020B0502020202020204" pitchFamily="34" charset="0"/>
+                <a:cs typeface="Arial" panose="020B0604020202020204" pitchFamily="34" charset="0"/>
+              </a:rPr>
+              <a:t>Every freshman is in the gym until next week</a:t>
+            </a:r>
+          </a:p>
+        </p:txBody>
+      </p:sp>
+      <p:cxnSp>
+        <p:nvCxnSpPr>
+          <p:cNvPr id="86" name="Straight Arrow Connector 85"/>
+          <p:cNvCxnSpPr>
+            <a:cxnSpLocks/>
+          </p:cNvCxnSpPr>
+          <p:nvPr/>
+        </p:nvCxnSpPr>
+        <p:spPr>
+          <a:xfrm flipH="1">
+            <a:off x="2126456" y="1450359"/>
+            <a:ext cx="976878" cy="111741"/>
+          </a:xfrm>
+          <a:prstGeom prst="straightConnector1">
+            <a:avLst/>
+          </a:prstGeom>
+          <a:ln>
+            <a:solidFill>
+              <a:schemeClr val="bg2"/>
+            </a:solidFill>
+            <a:tailEnd type="triangle"/>
+          </a:ln>
+        </p:spPr>
+        <p:style>
+          <a:lnRef idx="1">
+            <a:schemeClr val="accent1"/>
+          </a:lnRef>
+          <a:fillRef idx="0">
+            <a:schemeClr val="accent1"/>
+          </a:fillRef>
+          <a:effectRef idx="0">
+            <a:schemeClr val="accent1"/>
+          </a:effectRef>
+          <a:fontRef idx="minor">
+            <a:schemeClr val="tx1"/>
+          </a:fontRef>
+        </p:style>
+      </p:cxnSp>
+    </p:spTree>
+    <p:extLst>
+      <p:ext uri="{BB962C8B-B14F-4D97-AF65-F5344CB8AC3E}">
+        <p14:creationId xmlns:p14="http://schemas.microsoft.com/office/powerpoint/2010/main" val="3065806878"/>
+      </p:ext>
+    </p:extLst>
+  </p:cSld>
+  <p:clrMapOvr>
+    <a:masterClrMapping/>
+  </p:clrMapOvr>
+</p:sld>
+</file>
+
+<file path=ppt/slides/slide11.xml><?xml version="1.0" encoding="utf-8"?>
+<p:sld xmlns:a="http://schemas.openxmlformats.org/drawingml/2006/main" xmlns:r="http://schemas.openxmlformats.org/officeDocument/2006/relationships" xmlns:p="http://schemas.openxmlformats.org/presentationml/2006/main">
+  <p:cSld>
+    <p:spTree>
+      <p:nvGrpSpPr>
+        <p:cNvPr id="1" name=""/>
+        <p:cNvGrpSpPr/>
+        <p:nvPr/>
+      </p:nvGrpSpPr>
+      <p:grpSpPr>
+        <a:xfrm>
+          <a:off x="0" y="0"/>
+          <a:ext cx="0" cy="0"/>
+          <a:chOff x="0" y="0"/>
+          <a:chExt cx="0" cy="0"/>
+        </a:xfrm>
+      </p:grpSpPr>
+      <p:sp>
+        <p:nvSpPr>
+          <p:cNvPr id="49" name="TextBox 48"/>
+          <p:cNvSpPr txBox="1"/>
+          <p:nvPr/>
+        </p:nvSpPr>
+        <p:spPr>
+          <a:xfrm>
+            <a:off x="404480" y="2724000"/>
+            <a:ext cx="507831" cy="1410001"/>
+          </a:xfrm>
+          <a:prstGeom prst="rect">
+            <a:avLst/>
+          </a:prstGeom>
+          <a:noFill/>
+        </p:spPr>
+        <p:txBody>
+          <a:bodyPr vert="vert270" wrap="none" rtlCol="0">
+            <a:spAutoFit/>
+          </a:bodyPr>
+          <a:lstStyle/>
+          <a:p>
+            <a:pPr algn="ctr"/>
+            <a:r>
+              <a:rPr lang="en-US" sz="1200" b="1" dirty="0">
+                <a:latin typeface="Arial" panose="020B0604020202020204" pitchFamily="34" charset="0"/>
+                <a:cs typeface="Arial" panose="020B0604020202020204" pitchFamily="34" charset="0"/>
+              </a:rPr>
+              <a:t>Number of People</a:t>
+            </a:r>
+          </a:p>
+          <a:p>
+            <a:pPr algn="ctr"/>
+            <a:r>
+              <a:rPr lang="en-US" sz="900" dirty="0">
+                <a:latin typeface="Arial" panose="020B0604020202020204" pitchFamily="34" charset="0"/>
+                <a:cs typeface="Arial" panose="020B0604020202020204" pitchFamily="34" charset="0"/>
+              </a:rPr>
+              <a:t>(7-day Moving Average)</a:t>
+            </a:r>
+            <a:endParaRPr lang="en-US" sz="1400" dirty="0">
+              <a:latin typeface="Arial" panose="020B0604020202020204" pitchFamily="34" charset="0"/>
+              <a:cs typeface="Arial" panose="020B0604020202020204" pitchFamily="34" charset="0"/>
+            </a:endParaRPr>
+          </a:p>
+        </p:txBody>
+      </p:sp>
+      <p:pic>
+        <p:nvPicPr>
+          <p:cNvPr id="51" name="Picture 50"/>
+          <p:cNvPicPr>
+            <a:picLocks noChangeAspect="1"/>
+          </p:cNvPicPr>
+          <p:nvPr/>
+        </p:nvPicPr>
+        <p:blipFill rotWithShape="1">
+          <a:blip r:embed="rId2">
+            <a:extLst>
+              <a:ext uri="{28A0092B-C50C-407E-A947-70E740481C1C}">
+                <a14:useLocalDpi xmlns:a14="http://schemas.microsoft.com/office/drawing/2010/main" val="0"/>
+              </a:ext>
+            </a:extLst>
+          </a:blip>
+          <a:srcRect l="2222" t="3819" r="2086" b="3567"/>
+          <a:stretch/>
+        </p:blipFill>
+        <p:spPr>
+          <a:xfrm>
+            <a:off x="1055459" y="1072536"/>
+            <a:ext cx="10255250" cy="5293497"/>
+          </a:xfrm>
+          <a:prstGeom prst="rect">
+            <a:avLst/>
+          </a:prstGeom>
+        </p:spPr>
+      </p:pic>
+      <p:sp>
+        <p:nvSpPr>
+          <p:cNvPr id="53" name="TextBox 52"/>
+          <p:cNvSpPr txBox="1"/>
+          <p:nvPr/>
+        </p:nvSpPr>
+        <p:spPr>
+          <a:xfrm>
+            <a:off x="5823050" y="6411684"/>
+            <a:ext cx="647934" cy="276999"/>
+          </a:xfrm>
+          <a:prstGeom prst="rect">
+            <a:avLst/>
+          </a:prstGeom>
+          <a:noFill/>
+        </p:spPr>
+        <p:txBody>
+          <a:bodyPr wrap="none" rtlCol="0">
+            <a:spAutoFit/>
+          </a:bodyPr>
+          <a:lstStyle/>
+          <a:p>
+            <a:r>
+              <a:rPr lang="en-US" sz="1200" b="1" dirty="0">
+                <a:latin typeface="Arial" panose="020B0604020202020204" pitchFamily="34" charset="0"/>
+                <a:cs typeface="Arial" panose="020B0604020202020204" pitchFamily="34" charset="0"/>
+              </a:rPr>
+              <a:t>Month</a:t>
+            </a:r>
+            <a:endParaRPr lang="en-US" sz="1400" b="1" dirty="0">
+              <a:latin typeface="Arial" panose="020B0604020202020204" pitchFamily="34" charset="0"/>
+              <a:cs typeface="Arial" panose="020B0604020202020204" pitchFamily="34" charset="0"/>
+            </a:endParaRPr>
+          </a:p>
+        </p:txBody>
+      </p:sp>
+      <p:sp>
+        <p:nvSpPr>
+          <p:cNvPr id="54" name="TextBox 53"/>
+          <p:cNvSpPr txBox="1"/>
+          <p:nvPr/>
+        </p:nvSpPr>
+        <p:spPr>
+          <a:xfrm>
+            <a:off x="6678270" y="1168985"/>
+            <a:ext cx="1994014" cy="851515"/>
+          </a:xfrm>
+          <a:prstGeom prst="rect">
+            <a:avLst/>
+          </a:prstGeom>
+          <a:noFill/>
+        </p:spPr>
+        <p:txBody>
+          <a:bodyPr wrap="square" rtlCol="0">
+            <a:spAutoFit/>
+          </a:bodyPr>
+          <a:lstStyle/>
+          <a:p>
+            <a:pPr>
+              <a:spcAft>
+                <a:spcPts val="100"/>
+              </a:spcAft>
+            </a:pPr>
+            <a:r>
+              <a:rPr lang="en-US" sz="1200" b="1" dirty="0">
+                <a:solidFill>
+                  <a:schemeClr val="bg2">
+                    <a:lumMod val="90000"/>
+                  </a:schemeClr>
+                </a:solidFill>
+                <a:latin typeface="Century Gothic" panose="020B0502020202020204" pitchFamily="34" charset="0"/>
+                <a:cs typeface="Arial" panose="020B0604020202020204" pitchFamily="34" charset="0"/>
+              </a:rPr>
+              <a:t>New Year’s Gym Rush</a:t>
+            </a:r>
+          </a:p>
+          <a:p>
+            <a:pPr>
+              <a:spcAft>
+                <a:spcPts val="200"/>
+              </a:spcAft>
+            </a:pPr>
+            <a:r>
+              <a:rPr lang="en-US" sz="1000" dirty="0">
+                <a:solidFill>
+                  <a:schemeClr val="bg2">
+                    <a:lumMod val="90000"/>
+                  </a:schemeClr>
+                </a:solidFill>
+                <a:latin typeface="Century Gothic" panose="020B0502020202020204" pitchFamily="34" charset="0"/>
+                <a:cs typeface="Arial" panose="020B0604020202020204" pitchFamily="34" charset="0"/>
+              </a:rPr>
+              <a:t>Jan 20, 2016</a:t>
+            </a:r>
+          </a:p>
+          <a:p>
+            <a:r>
+              <a:rPr lang="en-US" sz="800" i="1" dirty="0">
+                <a:solidFill>
+                  <a:schemeClr val="bg2">
+                    <a:lumMod val="90000"/>
+                  </a:schemeClr>
+                </a:solidFill>
+                <a:latin typeface="Century Gothic" panose="020B0502020202020204" pitchFamily="34" charset="0"/>
+                <a:cs typeface="Arial" panose="020B0604020202020204" pitchFamily="34" charset="0"/>
+              </a:rPr>
+              <a:t>Students flood to the gym in a futile attempt to fulfill their New Year’s goals</a:t>
+            </a:r>
+          </a:p>
+        </p:txBody>
+      </p:sp>
+      <p:cxnSp>
+        <p:nvCxnSpPr>
+          <p:cNvPr id="60" name="Straight Arrow Connector 59"/>
+          <p:cNvCxnSpPr>
+            <a:cxnSpLocks/>
+          </p:cNvCxnSpPr>
+          <p:nvPr/>
+        </p:nvCxnSpPr>
+        <p:spPr>
+          <a:xfrm flipH="1">
+            <a:off x="5741759" y="1433497"/>
+            <a:ext cx="974611" cy="33724"/>
+          </a:xfrm>
+          <a:prstGeom prst="straightConnector1">
+            <a:avLst/>
+          </a:prstGeom>
+          <a:ln>
+            <a:solidFill>
+              <a:schemeClr val="bg2"/>
+            </a:solidFill>
+            <a:tailEnd type="triangle"/>
+          </a:ln>
+        </p:spPr>
+        <p:style>
+          <a:lnRef idx="1">
+            <a:schemeClr val="accent1"/>
+          </a:lnRef>
+          <a:fillRef idx="0">
+            <a:schemeClr val="accent1"/>
+          </a:fillRef>
+          <a:effectRef idx="0">
+            <a:schemeClr val="accent1"/>
+          </a:effectRef>
+          <a:fontRef idx="minor">
+            <a:schemeClr val="tx1"/>
+          </a:fontRef>
+        </p:style>
+      </p:cxnSp>
+      <p:cxnSp>
+        <p:nvCxnSpPr>
+          <p:cNvPr id="61" name="Straight Arrow Connector 60"/>
+          <p:cNvCxnSpPr>
+            <a:cxnSpLocks/>
+          </p:cNvCxnSpPr>
+          <p:nvPr/>
+        </p:nvCxnSpPr>
+        <p:spPr>
+          <a:xfrm flipV="1">
+            <a:off x="4584700" y="4626041"/>
+            <a:ext cx="317272" cy="382366"/>
+          </a:xfrm>
+          <a:prstGeom prst="straightConnector1">
+            <a:avLst/>
+          </a:prstGeom>
+          <a:ln>
+            <a:solidFill>
+              <a:schemeClr val="bg2"/>
+            </a:solidFill>
+            <a:tailEnd type="triangle"/>
+          </a:ln>
+        </p:spPr>
+        <p:style>
+          <a:lnRef idx="1">
+            <a:schemeClr val="accent1"/>
+          </a:lnRef>
+          <a:fillRef idx="0">
+            <a:schemeClr val="accent1"/>
+          </a:fillRef>
+          <a:effectRef idx="0">
+            <a:schemeClr val="accent1"/>
+          </a:effectRef>
+          <a:fontRef idx="minor">
+            <a:schemeClr val="tx1"/>
+          </a:fontRef>
+        </p:style>
+      </p:cxnSp>
+      <p:sp>
+        <p:nvSpPr>
+          <p:cNvPr id="64" name="TextBox 63"/>
+          <p:cNvSpPr txBox="1"/>
+          <p:nvPr/>
+        </p:nvSpPr>
+        <p:spPr>
+          <a:xfrm>
+            <a:off x="968375" y="264531"/>
+            <a:ext cx="5178311" cy="461665"/>
+          </a:xfrm>
+          <a:prstGeom prst="rect">
+            <a:avLst/>
+          </a:prstGeom>
+          <a:noFill/>
+        </p:spPr>
+        <p:txBody>
+          <a:bodyPr wrap="square" rtlCol="0">
+            <a:spAutoFit/>
+          </a:bodyPr>
+          <a:lstStyle/>
+          <a:p>
+            <a:r>
+              <a:rPr lang="en-US" sz="2400" dirty="0">
+                <a:latin typeface="Futura-Normal" pitchFamily="2" charset="0"/>
+              </a:rPr>
+              <a:t>UC Berkeley 2015-16 Gym Attendance</a:t>
+            </a:r>
+          </a:p>
+        </p:txBody>
+      </p:sp>
+      <p:sp>
+        <p:nvSpPr>
+          <p:cNvPr id="65" name="TextBox 64"/>
+          <p:cNvSpPr txBox="1"/>
+          <p:nvPr/>
+        </p:nvSpPr>
+        <p:spPr>
+          <a:xfrm>
+            <a:off x="3539744" y="5008407"/>
+            <a:ext cx="1617448" cy="715581"/>
+          </a:xfrm>
+          <a:prstGeom prst="rect">
+            <a:avLst/>
+          </a:prstGeom>
+          <a:noFill/>
+        </p:spPr>
+        <p:txBody>
+          <a:bodyPr wrap="square" rtlCol="0">
+            <a:spAutoFit/>
+          </a:bodyPr>
+          <a:lstStyle/>
+          <a:p>
+            <a:pPr>
+              <a:spcAft>
+                <a:spcPts val="100"/>
+              </a:spcAft>
+            </a:pPr>
+            <a:r>
+              <a:rPr lang="en-US" sz="1200" b="1" dirty="0">
+                <a:solidFill>
+                  <a:schemeClr val="bg2">
+                    <a:lumMod val="90000"/>
+                  </a:schemeClr>
+                </a:solidFill>
+                <a:latin typeface="Century Gothic" panose="020B0502020202020204" pitchFamily="34" charset="0"/>
+                <a:cs typeface="Arial" panose="020B0604020202020204" pitchFamily="34" charset="0"/>
+              </a:rPr>
+              <a:t>Winter Break</a:t>
+            </a:r>
+          </a:p>
+          <a:p>
+            <a:pPr>
+              <a:spcAft>
+                <a:spcPts val="200"/>
+              </a:spcAft>
+            </a:pPr>
+            <a:r>
+              <a:rPr lang="en-US" sz="1000" dirty="0">
+                <a:solidFill>
+                  <a:schemeClr val="bg2">
+                    <a:lumMod val="90000"/>
+                  </a:schemeClr>
+                </a:solidFill>
+                <a:latin typeface="Century Gothic" panose="020B0502020202020204" pitchFamily="34" charset="0"/>
+                <a:cs typeface="Arial" panose="020B0604020202020204" pitchFamily="34" charset="0"/>
+              </a:rPr>
+              <a:t>Dec 19-Jan 19, 2015</a:t>
+            </a:r>
+          </a:p>
+          <a:p>
+            <a:r>
+              <a:rPr lang="en-US" sz="800" i="1" dirty="0">
+                <a:solidFill>
+                  <a:schemeClr val="bg2">
+                    <a:lumMod val="90000"/>
+                  </a:schemeClr>
+                </a:solidFill>
+                <a:latin typeface="Century Gothic" panose="020B0502020202020204" pitchFamily="34" charset="0"/>
+                <a:cs typeface="Arial" panose="020B0604020202020204" pitchFamily="34" charset="0"/>
+              </a:rPr>
+              <a:t>Most students head home for the winter holidays</a:t>
+            </a:r>
+          </a:p>
+        </p:txBody>
+      </p:sp>
+      <p:sp>
+        <p:nvSpPr>
+          <p:cNvPr id="66" name="TextBox 65"/>
+          <p:cNvSpPr txBox="1"/>
+          <p:nvPr/>
+        </p:nvSpPr>
+        <p:spPr>
+          <a:xfrm>
+            <a:off x="2023091" y="3516084"/>
+            <a:ext cx="1624984" cy="838691"/>
+          </a:xfrm>
+          <a:prstGeom prst="rect">
+            <a:avLst/>
+          </a:prstGeom>
+          <a:noFill/>
+        </p:spPr>
+        <p:txBody>
+          <a:bodyPr wrap="square" rtlCol="0">
+            <a:spAutoFit/>
+          </a:bodyPr>
+          <a:lstStyle/>
+          <a:p>
+            <a:pPr>
+              <a:spcAft>
+                <a:spcPts val="100"/>
+              </a:spcAft>
+            </a:pPr>
+            <a:r>
+              <a:rPr lang="en-US" sz="1200" b="1" dirty="0">
+                <a:solidFill>
+                  <a:schemeClr val="bg2">
+                    <a:lumMod val="90000"/>
+                  </a:schemeClr>
+                </a:solidFill>
+                <a:latin typeface="Century Gothic" panose="020B0502020202020204" pitchFamily="34" charset="0"/>
+                <a:cs typeface="Arial" panose="020B0604020202020204" pitchFamily="34" charset="0"/>
+              </a:rPr>
+              <a:t>Thanksgiving</a:t>
+            </a:r>
+          </a:p>
+          <a:p>
+            <a:pPr>
+              <a:spcAft>
+                <a:spcPts val="200"/>
+              </a:spcAft>
+            </a:pPr>
+            <a:r>
+              <a:rPr lang="en-US" sz="1000" dirty="0">
+                <a:solidFill>
+                  <a:schemeClr val="bg2">
+                    <a:lumMod val="90000"/>
+                  </a:schemeClr>
+                </a:solidFill>
+                <a:latin typeface="Century Gothic" panose="020B0502020202020204" pitchFamily="34" charset="0"/>
+                <a:cs typeface="Arial" panose="020B0604020202020204" pitchFamily="34" charset="0"/>
+              </a:rPr>
+              <a:t>Nov 26 2015</a:t>
+            </a:r>
+          </a:p>
+          <a:p>
+            <a:r>
+              <a:rPr lang="en-US" sz="800" i="1" dirty="0">
+                <a:solidFill>
+                  <a:schemeClr val="bg2">
+                    <a:lumMod val="90000"/>
+                  </a:schemeClr>
+                </a:solidFill>
+                <a:latin typeface="Century Gothic" panose="020B0502020202020204" pitchFamily="34" charset="0"/>
+                <a:cs typeface="Arial" panose="020B0604020202020204" pitchFamily="34" charset="0"/>
+              </a:rPr>
+              <a:t>Working out is optional when you’re filling up on turkey and mashed potatoes</a:t>
+            </a:r>
+          </a:p>
+        </p:txBody>
+      </p:sp>
+      <p:cxnSp>
+        <p:nvCxnSpPr>
+          <p:cNvPr id="67" name="Straight Arrow Connector 66"/>
+          <p:cNvCxnSpPr>
+            <a:cxnSpLocks/>
+          </p:cNvCxnSpPr>
+          <p:nvPr/>
+        </p:nvCxnSpPr>
+        <p:spPr>
+          <a:xfrm flipV="1">
+            <a:off x="3249384" y="3601809"/>
+            <a:ext cx="926306" cy="219076"/>
+          </a:xfrm>
+          <a:prstGeom prst="straightConnector1">
+            <a:avLst/>
+          </a:prstGeom>
+          <a:ln>
+            <a:solidFill>
+              <a:schemeClr val="bg2"/>
+            </a:solidFill>
+            <a:tailEnd type="triangle"/>
+          </a:ln>
+        </p:spPr>
+        <p:style>
+          <a:lnRef idx="1">
+            <a:schemeClr val="accent1"/>
+          </a:lnRef>
+          <a:fillRef idx="0">
+            <a:schemeClr val="accent1"/>
+          </a:fillRef>
+          <a:effectRef idx="0">
+            <a:schemeClr val="accent1"/>
+          </a:effectRef>
+          <a:fontRef idx="minor">
+            <a:schemeClr val="tx1"/>
+          </a:fontRef>
+        </p:style>
+      </p:cxnSp>
+      <p:sp>
+        <p:nvSpPr>
+          <p:cNvPr id="72" name="TextBox 71"/>
+          <p:cNvSpPr txBox="1"/>
+          <p:nvPr/>
+        </p:nvSpPr>
+        <p:spPr>
+          <a:xfrm>
+            <a:off x="5910722" y="5008407"/>
+            <a:ext cx="1535095" cy="592470"/>
+          </a:xfrm>
+          <a:prstGeom prst="rect">
+            <a:avLst/>
+          </a:prstGeom>
+          <a:noFill/>
+        </p:spPr>
+        <p:txBody>
+          <a:bodyPr wrap="square" rtlCol="0">
+            <a:spAutoFit/>
+          </a:bodyPr>
+          <a:lstStyle/>
+          <a:p>
+            <a:pPr>
+              <a:spcAft>
+                <a:spcPts val="100"/>
+              </a:spcAft>
+            </a:pPr>
+            <a:r>
+              <a:rPr lang="en-US" sz="1200" b="1" dirty="0">
+                <a:solidFill>
+                  <a:schemeClr val="bg2">
+                    <a:lumMod val="90000"/>
+                  </a:schemeClr>
+                </a:solidFill>
+                <a:latin typeface="Century Gothic" panose="020B0502020202020204" pitchFamily="34" charset="0"/>
+                <a:cs typeface="Arial" panose="020B0604020202020204" pitchFamily="34" charset="0"/>
+              </a:rPr>
+              <a:t>Spring Break</a:t>
+            </a:r>
+          </a:p>
+          <a:p>
+            <a:pPr>
+              <a:spcAft>
+                <a:spcPts val="200"/>
+              </a:spcAft>
+            </a:pPr>
+            <a:r>
+              <a:rPr lang="en-US" sz="1000" dirty="0">
+                <a:solidFill>
+                  <a:schemeClr val="bg2">
+                    <a:lumMod val="90000"/>
+                  </a:schemeClr>
+                </a:solidFill>
+                <a:latin typeface="Century Gothic" panose="020B0502020202020204" pitchFamily="34" charset="0"/>
+                <a:cs typeface="Arial" panose="020B0604020202020204" pitchFamily="34" charset="0"/>
+              </a:rPr>
+              <a:t>Mar 21-25, 2016</a:t>
+            </a:r>
+          </a:p>
+          <a:p>
+            <a:r>
+              <a:rPr lang="en-US" sz="800" i="1" dirty="0">
+                <a:solidFill>
+                  <a:schemeClr val="bg2">
+                    <a:lumMod val="90000"/>
+                  </a:schemeClr>
+                </a:solidFill>
+                <a:latin typeface="Century Gothic" panose="020B0502020202020204" pitchFamily="34" charset="0"/>
+                <a:cs typeface="Arial" panose="020B0604020202020204" pitchFamily="34" charset="0"/>
+              </a:rPr>
+              <a:t>Spring break! Party! Woo!</a:t>
+            </a:r>
+          </a:p>
+        </p:txBody>
+      </p:sp>
+      <p:cxnSp>
+        <p:nvCxnSpPr>
+          <p:cNvPr id="80" name="Straight Arrow Connector 79"/>
+          <p:cNvCxnSpPr>
+            <a:cxnSpLocks/>
+          </p:cNvCxnSpPr>
+          <p:nvPr/>
+        </p:nvCxnSpPr>
+        <p:spPr>
+          <a:xfrm flipV="1">
+            <a:off x="6934200" y="4354775"/>
+            <a:ext cx="400050" cy="653632"/>
+          </a:xfrm>
+          <a:prstGeom prst="straightConnector1">
+            <a:avLst/>
+          </a:prstGeom>
+          <a:ln>
+            <a:solidFill>
+              <a:schemeClr val="bg2"/>
+            </a:solidFill>
+            <a:tailEnd type="triangle"/>
+          </a:ln>
+        </p:spPr>
+        <p:style>
+          <a:lnRef idx="1">
+            <a:schemeClr val="accent1"/>
+          </a:lnRef>
+          <a:fillRef idx="0">
+            <a:schemeClr val="accent1"/>
+          </a:fillRef>
+          <a:effectRef idx="0">
+            <a:schemeClr val="accent1"/>
+          </a:effectRef>
+          <a:fontRef idx="minor">
+            <a:schemeClr val="tx1"/>
+          </a:fontRef>
+        </p:style>
+      </p:cxnSp>
+      <p:sp>
+        <p:nvSpPr>
+          <p:cNvPr id="85" name="TextBox 84"/>
+          <p:cNvSpPr txBox="1"/>
+          <p:nvPr/>
+        </p:nvSpPr>
+        <p:spPr>
+          <a:xfrm>
+            <a:off x="3103334" y="1105594"/>
+            <a:ext cx="1481366" cy="715581"/>
+          </a:xfrm>
+          <a:prstGeom prst="rect">
+            <a:avLst/>
+          </a:prstGeom>
+          <a:noFill/>
+        </p:spPr>
+        <p:txBody>
+          <a:bodyPr wrap="square" rtlCol="0">
+            <a:spAutoFit/>
+          </a:bodyPr>
+          <a:lstStyle/>
+          <a:p>
+            <a:pPr>
+              <a:spcAft>
+                <a:spcPts val="100"/>
+              </a:spcAft>
+            </a:pPr>
+            <a:r>
+              <a:rPr lang="en-US" sz="1200" b="1" dirty="0">
+                <a:solidFill>
+                  <a:schemeClr val="bg2">
+                    <a:lumMod val="90000"/>
+                  </a:schemeClr>
+                </a:solidFill>
+                <a:latin typeface="Century Gothic" panose="020B0502020202020204" pitchFamily="34" charset="0"/>
+                <a:cs typeface="Arial" panose="020B0604020202020204" pitchFamily="34" charset="0"/>
+              </a:rPr>
+              <a:t>School Begins</a:t>
+            </a:r>
+          </a:p>
+          <a:p>
+            <a:pPr>
+              <a:spcAft>
+                <a:spcPts val="200"/>
+              </a:spcAft>
+            </a:pPr>
+            <a:r>
+              <a:rPr lang="en-US" sz="1000" dirty="0">
+                <a:solidFill>
+                  <a:schemeClr val="bg2">
+                    <a:lumMod val="90000"/>
+                  </a:schemeClr>
+                </a:solidFill>
+                <a:latin typeface="Century Gothic" panose="020B0502020202020204" pitchFamily="34" charset="0"/>
+                <a:cs typeface="Arial" panose="020B0604020202020204" pitchFamily="34" charset="0"/>
+              </a:rPr>
+              <a:t>Aug 26, 2016</a:t>
+            </a:r>
+          </a:p>
+          <a:p>
+            <a:r>
+              <a:rPr lang="en-US" sz="800" i="1" dirty="0">
+                <a:solidFill>
+                  <a:schemeClr val="bg2">
+                    <a:lumMod val="90000"/>
+                  </a:schemeClr>
+                </a:solidFill>
+                <a:latin typeface="Century Gothic" panose="020B0502020202020204" pitchFamily="34" charset="0"/>
+                <a:cs typeface="Arial" panose="020B0604020202020204" pitchFamily="34" charset="0"/>
+              </a:rPr>
+              <a:t>Every freshman is in the gym until next week</a:t>
+            </a:r>
+          </a:p>
+        </p:txBody>
+      </p:sp>
+      <p:cxnSp>
+        <p:nvCxnSpPr>
+          <p:cNvPr id="86" name="Straight Arrow Connector 85"/>
+          <p:cNvCxnSpPr>
+            <a:cxnSpLocks/>
+          </p:cNvCxnSpPr>
+          <p:nvPr/>
+        </p:nvCxnSpPr>
+        <p:spPr>
+          <a:xfrm flipH="1">
+            <a:off x="2126456" y="1450359"/>
+            <a:ext cx="976878" cy="111741"/>
+          </a:xfrm>
+          <a:prstGeom prst="straightConnector1">
+            <a:avLst/>
+          </a:prstGeom>
+          <a:ln>
+            <a:solidFill>
+              <a:schemeClr val="bg2"/>
+            </a:solidFill>
+            <a:tailEnd type="triangle"/>
+          </a:ln>
+        </p:spPr>
+        <p:style>
+          <a:lnRef idx="1">
+            <a:schemeClr val="accent1"/>
+          </a:lnRef>
+          <a:fillRef idx="0">
+            <a:schemeClr val="accent1"/>
+          </a:fillRef>
+          <a:effectRef idx="0">
+            <a:schemeClr val="accent1"/>
+          </a:effectRef>
+          <a:fontRef idx="minor">
+            <a:schemeClr val="tx1"/>
+          </a:fontRef>
+        </p:style>
+      </p:cxnSp>
+      <p:sp>
+        <p:nvSpPr>
+          <p:cNvPr id="89" name="TextBox 88"/>
+          <p:cNvSpPr txBox="1"/>
+          <p:nvPr/>
+        </p:nvSpPr>
+        <p:spPr>
+          <a:xfrm>
+            <a:off x="9412888" y="2724000"/>
+            <a:ext cx="2040969" cy="715581"/>
+          </a:xfrm>
+          <a:prstGeom prst="rect">
+            <a:avLst/>
+          </a:prstGeom>
+          <a:noFill/>
+        </p:spPr>
+        <p:txBody>
+          <a:bodyPr wrap="square" rtlCol="0">
+            <a:spAutoFit/>
+          </a:bodyPr>
+          <a:lstStyle/>
+          <a:p>
+            <a:pPr>
+              <a:spcAft>
+                <a:spcPts val="100"/>
+              </a:spcAft>
+            </a:pPr>
+            <a:r>
+              <a:rPr lang="en-US" sz="1200" b="1" dirty="0">
+                <a:latin typeface="Century Gothic" panose="020B0502020202020204" pitchFamily="34" charset="0"/>
+                <a:cs typeface="Arial" panose="020B0604020202020204" pitchFamily="34" charset="0"/>
+              </a:rPr>
+              <a:t>Spring Commencement</a:t>
+            </a:r>
+          </a:p>
+          <a:p>
+            <a:pPr>
+              <a:spcAft>
+                <a:spcPts val="200"/>
+              </a:spcAft>
+            </a:pPr>
+            <a:r>
+              <a:rPr lang="en-US" sz="1000" dirty="0">
+                <a:latin typeface="Century Gothic" panose="020B0502020202020204" pitchFamily="34" charset="0"/>
+                <a:cs typeface="Arial" panose="020B0604020202020204" pitchFamily="34" charset="0"/>
+              </a:rPr>
+              <a:t>May 14, 2016</a:t>
+            </a:r>
+          </a:p>
+          <a:p>
+            <a:r>
+              <a:rPr lang="en-US" sz="800" i="1" dirty="0">
+                <a:latin typeface="Century Gothic" panose="020B0502020202020204" pitchFamily="34" charset="0"/>
+                <a:cs typeface="Arial" panose="020B0604020202020204" pitchFamily="34" charset="0"/>
+              </a:rPr>
+              <a:t>The gym becomes an empty wasteland until next year</a:t>
+            </a:r>
+          </a:p>
+        </p:txBody>
+      </p:sp>
+      <p:cxnSp>
+        <p:nvCxnSpPr>
+          <p:cNvPr id="92" name="Straight Arrow Connector 91"/>
+          <p:cNvCxnSpPr>
+            <a:cxnSpLocks/>
+          </p:cNvCxnSpPr>
+          <p:nvPr/>
+        </p:nvCxnSpPr>
+        <p:spPr>
+          <a:xfrm flipH="1">
+            <a:off x="8976220" y="3429000"/>
+            <a:ext cx="510681" cy="773884"/>
+          </a:xfrm>
+          <a:prstGeom prst="straightConnector1">
+            <a:avLst/>
+          </a:prstGeom>
+          <a:ln>
+            <a:tailEnd type="triangle"/>
+          </a:ln>
+        </p:spPr>
+        <p:style>
+          <a:lnRef idx="1">
+            <a:schemeClr val="accent1"/>
+          </a:lnRef>
+          <a:fillRef idx="0">
+            <a:schemeClr val="accent1"/>
+          </a:fillRef>
+          <a:effectRef idx="0">
+            <a:schemeClr val="accent1"/>
+          </a:effectRef>
+          <a:fontRef idx="minor">
+            <a:schemeClr val="tx1"/>
+          </a:fontRef>
+        </p:style>
+      </p:cxnSp>
+    </p:spTree>
+    <p:extLst>
+      <p:ext uri="{BB962C8B-B14F-4D97-AF65-F5344CB8AC3E}">
+        <p14:creationId xmlns:p14="http://schemas.microsoft.com/office/powerpoint/2010/main" val="3988067614"/>
+      </p:ext>
+    </p:extLst>
+  </p:cSld>
+  <p:clrMapOvr>
+    <a:masterClrMapping/>
+  </p:clrMapOvr>
+</p:sld>
+</file>
+
+<file path=ppt/slides/slide12.xml><?xml version="1.0" encoding="utf-8"?>
+<p:sld xmlns:a="http://schemas.openxmlformats.org/drawingml/2006/main" xmlns:r="http://schemas.openxmlformats.org/officeDocument/2006/relationships" xmlns:p="http://schemas.openxmlformats.org/presentationml/2006/main">
+  <p:cSld>
+    <p:spTree>
+      <p:nvGrpSpPr>
+        <p:cNvPr id="1" name=""/>
+        <p:cNvGrpSpPr/>
+        <p:nvPr/>
+      </p:nvGrpSpPr>
+      <p:grpSpPr>
+        <a:xfrm>
+          <a:off x="0" y="0"/>
+          <a:ext cx="0" cy="0"/>
+          <a:chOff x="0" y="0"/>
+          <a:chExt cx="0" cy="0"/>
+        </a:xfrm>
+      </p:grpSpPr>
+      <p:sp>
+        <p:nvSpPr>
+          <p:cNvPr id="49" name="TextBox 48"/>
+          <p:cNvSpPr txBox="1"/>
+          <p:nvPr/>
+        </p:nvSpPr>
+        <p:spPr>
+          <a:xfrm>
+            <a:off x="404480" y="2724000"/>
+            <a:ext cx="507831" cy="1410001"/>
+          </a:xfrm>
+          <a:prstGeom prst="rect">
+            <a:avLst/>
+          </a:prstGeom>
+          <a:noFill/>
+        </p:spPr>
+        <p:txBody>
+          <a:bodyPr vert="vert270" wrap="none" rtlCol="0">
+            <a:spAutoFit/>
+          </a:bodyPr>
+          <a:lstStyle/>
+          <a:p>
+            <a:pPr algn="ctr"/>
+            <a:r>
+              <a:rPr lang="en-US" sz="1200" b="1" dirty="0">
+                <a:latin typeface="Arial" panose="020B0604020202020204" pitchFamily="34" charset="0"/>
+                <a:cs typeface="Arial" panose="020B0604020202020204" pitchFamily="34" charset="0"/>
+              </a:rPr>
+              <a:t>Number of People</a:t>
+            </a:r>
+          </a:p>
+          <a:p>
+            <a:pPr algn="ctr"/>
+            <a:r>
+              <a:rPr lang="en-US" sz="900" dirty="0">
+                <a:latin typeface="Arial" panose="020B0604020202020204" pitchFamily="34" charset="0"/>
+                <a:cs typeface="Arial" panose="020B0604020202020204" pitchFamily="34" charset="0"/>
+              </a:rPr>
+              <a:t>(7-day Moving Average)</a:t>
+            </a:r>
+            <a:endParaRPr lang="en-US" sz="1400" dirty="0">
+              <a:latin typeface="Arial" panose="020B0604020202020204" pitchFamily="34" charset="0"/>
+              <a:cs typeface="Arial" panose="020B0604020202020204" pitchFamily="34" charset="0"/>
+            </a:endParaRPr>
+          </a:p>
+        </p:txBody>
+      </p:sp>
+      <p:pic>
+        <p:nvPicPr>
+          <p:cNvPr id="51" name="Picture 50"/>
+          <p:cNvPicPr>
+            <a:picLocks noChangeAspect="1"/>
+          </p:cNvPicPr>
+          <p:nvPr/>
+        </p:nvPicPr>
+        <p:blipFill rotWithShape="1">
+          <a:blip r:embed="rId2">
+            <a:extLst>
+              <a:ext uri="{28A0092B-C50C-407E-A947-70E740481C1C}">
+                <a14:useLocalDpi xmlns:a14="http://schemas.microsoft.com/office/drawing/2010/main" val="0"/>
+              </a:ext>
+            </a:extLst>
+          </a:blip>
+          <a:srcRect l="2222" t="3819" r="2086" b="3567"/>
+          <a:stretch/>
+        </p:blipFill>
+        <p:spPr>
+          <a:xfrm>
+            <a:off x="1055459" y="1072536"/>
+            <a:ext cx="10255250" cy="5293497"/>
+          </a:xfrm>
+          <a:prstGeom prst="rect">
+            <a:avLst/>
+          </a:prstGeom>
         </p:spPr>
       </p:pic>
       <p:sp>
@@ -3795,6 +5427,426 @@
 </file>
 
 <file path=ppt/slides/slide2.xml><?xml version="1.0" encoding="utf-8"?>
+<p:sld xmlns:a="http://schemas.openxmlformats.org/drawingml/2006/main" xmlns:r="http://schemas.openxmlformats.org/officeDocument/2006/relationships" xmlns:p="http://schemas.openxmlformats.org/presentationml/2006/main">
+  <p:cSld>
+    <p:spTree>
+      <p:nvGrpSpPr>
+        <p:cNvPr id="1" name=""/>
+        <p:cNvGrpSpPr/>
+        <p:nvPr/>
+      </p:nvGrpSpPr>
+      <p:grpSpPr>
+        <a:xfrm>
+          <a:off x="0" y="0"/>
+          <a:ext cx="0" cy="0"/>
+          <a:chOff x="0" y="0"/>
+          <a:chExt cx="0" cy="0"/>
+        </a:xfrm>
+      </p:grpSpPr>
+      <p:sp>
+        <p:nvSpPr>
+          <p:cNvPr id="4" name="Rectangle 3"/>
+          <p:cNvSpPr/>
+          <p:nvPr/>
+        </p:nvSpPr>
+        <p:spPr>
+          <a:xfrm>
+            <a:off x="0" y="0"/>
+            <a:ext cx="12192000" cy="404037"/>
+          </a:xfrm>
+          <a:prstGeom prst="rect">
+            <a:avLst/>
+          </a:prstGeom>
+          <a:solidFill>
+            <a:srgbClr val="003A70"/>
+          </a:solidFill>
+          <a:ln>
+            <a:noFill/>
+          </a:ln>
+        </p:spPr>
+        <p:style>
+          <a:lnRef idx="2">
+            <a:schemeClr val="accent1">
+              <a:shade val="50000"/>
+            </a:schemeClr>
+          </a:lnRef>
+          <a:fillRef idx="1">
+            <a:schemeClr val="accent1"/>
+          </a:fillRef>
+          <a:effectRef idx="0">
+            <a:schemeClr val="accent1"/>
+          </a:effectRef>
+          <a:fontRef idx="minor">
+            <a:schemeClr val="lt1"/>
+          </a:fontRef>
+        </p:style>
+        <p:txBody>
+          <a:bodyPr rtlCol="0" anchor="ctr"/>
+          <a:lstStyle/>
+          <a:p>
+            <a:pPr algn="ctr"/>
+            <a:endParaRPr lang="en-US"/>
+          </a:p>
+        </p:txBody>
+      </p:sp>
+      <p:pic>
+        <p:nvPicPr>
+          <p:cNvPr id="6146" name="Picture 2" descr="http://images.performgroup.com/di/library/sporting_news/87/2b/california-logo-ftr_1x0i0rlknnslu169pwm0od9x5l.jpg?t=1984411995"/>
+          <p:cNvPicPr>
+            <a:picLocks noChangeAspect="1" noChangeArrowheads="1"/>
+          </p:cNvPicPr>
+          <p:nvPr/>
+        </p:nvPicPr>
+        <p:blipFill>
+          <a:blip r:embed="rId2">
+            <a:extLst>
+              <a:ext uri="{28A0092B-C50C-407E-A947-70E740481C1C}">
+                <a14:useLocalDpi xmlns:a14="http://schemas.microsoft.com/office/drawing/2010/main" val="0"/>
+              </a:ext>
+            </a:extLst>
+          </a:blip>
+          <a:srcRect/>
+          <a:stretch>
+            <a:fillRect/>
+          </a:stretch>
+        </p:blipFill>
+        <p:spPr bwMode="auto">
+          <a:xfrm>
+            <a:off x="1263340" y="1603670"/>
+            <a:ext cx="4256854" cy="2390592"/>
+          </a:xfrm>
+          <a:prstGeom prst="rect">
+            <a:avLst/>
+          </a:prstGeom>
+          <a:noFill/>
+          <a:extLst>
+            <a:ext uri="{909E8E84-426E-40DD-AFC4-6F175D3DCCD1}">
+              <a14:hiddenFill xmlns:a14="http://schemas.microsoft.com/office/drawing/2010/main">
+                <a:solidFill>
+                  <a:srgbClr val="FFFFFF"/>
+                </a:solidFill>
+              </a14:hiddenFill>
+            </a:ext>
+          </a:extLst>
+        </p:spPr>
+      </p:pic>
+      <p:sp>
+        <p:nvSpPr>
+          <p:cNvPr id="5" name="TextBox 4"/>
+          <p:cNvSpPr txBox="1"/>
+          <p:nvPr/>
+        </p:nvSpPr>
+        <p:spPr>
+          <a:xfrm>
+            <a:off x="5380331" y="1626565"/>
+            <a:ext cx="4742615" cy="1015663"/>
+          </a:xfrm>
+          <a:prstGeom prst="rect">
+            <a:avLst/>
+          </a:prstGeom>
+          <a:noFill/>
+        </p:spPr>
+        <p:txBody>
+          <a:bodyPr wrap="square" rtlCol="0">
+            <a:spAutoFit/>
+          </a:bodyPr>
+          <a:lstStyle/>
+          <a:p>
+            <a:r>
+              <a:rPr lang="en-US" sz="6000" dirty="0">
+                <a:solidFill>
+                  <a:srgbClr val="003A70"/>
+                </a:solidFill>
+                <a:latin typeface="Proxima Nova Lt" panose="02000506030000020004" pitchFamily="50" charset="0"/>
+              </a:rPr>
+              <a:t>UC Berkeley</a:t>
+            </a:r>
+          </a:p>
+        </p:txBody>
+      </p:sp>
+      <p:sp>
+        <p:nvSpPr>
+          <p:cNvPr id="7" name="TextBox 6"/>
+          <p:cNvSpPr txBox="1"/>
+          <p:nvPr/>
+        </p:nvSpPr>
+        <p:spPr>
+          <a:xfrm>
+            <a:off x="5380331" y="2670823"/>
+            <a:ext cx="4366102" cy="1323439"/>
+          </a:xfrm>
+          <a:prstGeom prst="rect">
+            <a:avLst/>
+          </a:prstGeom>
+          <a:noFill/>
+        </p:spPr>
+        <p:txBody>
+          <a:bodyPr wrap="square" rtlCol="0">
+            <a:spAutoFit/>
+          </a:bodyPr>
+          <a:lstStyle/>
+          <a:p>
+            <a:r>
+              <a:rPr lang="en-US" sz="4000" dirty="0">
+                <a:solidFill>
+                  <a:srgbClr val="D19000"/>
+                </a:solidFill>
+                <a:latin typeface="Proxima Nova Lt" panose="02000506030000020004" pitchFamily="50" charset="0"/>
+              </a:rPr>
+              <a:t>Gym Attendance</a:t>
+            </a:r>
+          </a:p>
+          <a:p>
+            <a:r>
+              <a:rPr lang="en-US" sz="4000" dirty="0">
+                <a:solidFill>
+                  <a:srgbClr val="D19000"/>
+                </a:solidFill>
+                <a:latin typeface="Proxima Nova Lt" panose="02000506030000020004" pitchFamily="50" charset="0"/>
+              </a:rPr>
+              <a:t>Analysis</a:t>
+            </a:r>
+          </a:p>
+        </p:txBody>
+      </p:sp>
+      <p:cxnSp>
+        <p:nvCxnSpPr>
+          <p:cNvPr id="8" name="Straight Connector 7"/>
+          <p:cNvCxnSpPr>
+            <a:cxnSpLocks/>
+          </p:cNvCxnSpPr>
+          <p:nvPr/>
+        </p:nvCxnSpPr>
+        <p:spPr>
+          <a:xfrm>
+            <a:off x="1978782" y="4541223"/>
+            <a:ext cx="8234436" cy="0"/>
+          </a:xfrm>
+          <a:prstGeom prst="line">
+            <a:avLst/>
+          </a:prstGeom>
+          <a:ln w="25400">
+            <a:solidFill>
+              <a:srgbClr val="003A70"/>
+            </a:solidFill>
+          </a:ln>
+        </p:spPr>
+        <p:style>
+          <a:lnRef idx="1">
+            <a:schemeClr val="accent1"/>
+          </a:lnRef>
+          <a:fillRef idx="0">
+            <a:schemeClr val="accent1"/>
+          </a:fillRef>
+          <a:effectRef idx="0">
+            <a:schemeClr val="accent1"/>
+          </a:effectRef>
+          <a:fontRef idx="minor">
+            <a:schemeClr val="tx1"/>
+          </a:fontRef>
+        </p:style>
+      </p:cxnSp>
+      <p:sp>
+        <p:nvSpPr>
+          <p:cNvPr id="10" name="TextBox 9"/>
+          <p:cNvSpPr txBox="1"/>
+          <p:nvPr/>
+        </p:nvSpPr>
+        <p:spPr>
+          <a:xfrm>
+            <a:off x="5151120" y="5565052"/>
+            <a:ext cx="1889760" cy="338554"/>
+          </a:xfrm>
+          <a:prstGeom prst="rect">
+            <a:avLst/>
+          </a:prstGeom>
+          <a:noFill/>
+        </p:spPr>
+        <p:txBody>
+          <a:bodyPr wrap="square" rtlCol="0">
+            <a:spAutoFit/>
+          </a:bodyPr>
+          <a:lstStyle/>
+          <a:p>
+            <a:pPr algn="ctr"/>
+            <a:r>
+              <a:rPr lang="en-US" sz="1600" dirty="0">
+                <a:solidFill>
+                  <a:schemeClr val="tx1">
+                    <a:lumMod val="85000"/>
+                    <a:lumOff val="15000"/>
+                  </a:schemeClr>
+                </a:solidFill>
+                <a:latin typeface="Proxima Nova Lt" panose="02000506030000020004" pitchFamily="50" charset="0"/>
+              </a:rPr>
+              <a:t>April 2017</a:t>
+            </a:r>
+          </a:p>
+        </p:txBody>
+      </p:sp>
+      <p:sp>
+        <p:nvSpPr>
+          <p:cNvPr id="12" name="TextBox 11"/>
+          <p:cNvSpPr txBox="1"/>
+          <p:nvPr/>
+        </p:nvSpPr>
+        <p:spPr>
+          <a:xfrm>
+            <a:off x="5227310" y="5103387"/>
+            <a:ext cx="1737381" cy="461665"/>
+          </a:xfrm>
+          <a:prstGeom prst="rect">
+            <a:avLst/>
+          </a:prstGeom>
+          <a:noFill/>
+        </p:spPr>
+        <p:txBody>
+          <a:bodyPr wrap="square" rtlCol="0">
+            <a:spAutoFit/>
+          </a:bodyPr>
+          <a:lstStyle/>
+          <a:p>
+            <a:pPr algn="ctr"/>
+            <a:r>
+              <a:rPr lang="en-US" sz="2400" dirty="0">
+                <a:solidFill>
+                  <a:schemeClr val="tx1">
+                    <a:lumMod val="85000"/>
+                    <a:lumOff val="15000"/>
+                  </a:schemeClr>
+                </a:solidFill>
+                <a:latin typeface="Proxima Nova Lt" panose="02000506030000020004" pitchFamily="50" charset="0"/>
+              </a:rPr>
+              <a:t>Jeff Ernst</a:t>
+            </a:r>
+          </a:p>
+        </p:txBody>
+      </p:sp>
+    </p:spTree>
+    <p:extLst>
+      <p:ext uri="{BB962C8B-B14F-4D97-AF65-F5344CB8AC3E}">
+        <p14:creationId xmlns:p14="http://schemas.microsoft.com/office/powerpoint/2010/main" val="285097410"/>
+      </p:ext>
+    </p:extLst>
+  </p:cSld>
+  <p:clrMapOvr>
+    <a:masterClrMapping/>
+  </p:clrMapOvr>
+</p:sld>
+</file>
+
+<file path=ppt/slides/slide3.xml><?xml version="1.0" encoding="utf-8"?>
+<p:sld xmlns:a="http://schemas.openxmlformats.org/drawingml/2006/main" xmlns:r="http://schemas.openxmlformats.org/officeDocument/2006/relationships" xmlns:p="http://schemas.openxmlformats.org/presentationml/2006/main">
+  <p:cSld>
+    <p:spTree>
+      <p:nvGrpSpPr>
+        <p:cNvPr id="1" name=""/>
+        <p:cNvGrpSpPr/>
+        <p:nvPr/>
+      </p:nvGrpSpPr>
+      <p:grpSpPr>
+        <a:xfrm>
+          <a:off x="0" y="0"/>
+          <a:ext cx="0" cy="0"/>
+          <a:chOff x="0" y="0"/>
+          <a:chExt cx="0" cy="0"/>
+        </a:xfrm>
+      </p:grpSpPr>
+      <p:sp>
+        <p:nvSpPr>
+          <p:cNvPr id="5" name="Rectangle 4"/>
+          <p:cNvSpPr/>
+          <p:nvPr/>
+        </p:nvSpPr>
+        <p:spPr>
+          <a:xfrm>
+            <a:off x="0" y="0"/>
+            <a:ext cx="12192000" cy="897622"/>
+          </a:xfrm>
+          <a:prstGeom prst="rect">
+            <a:avLst/>
+          </a:prstGeom>
+          <a:solidFill>
+            <a:srgbClr val="003A70"/>
+          </a:solidFill>
+          <a:ln>
+            <a:noFill/>
+          </a:ln>
+        </p:spPr>
+        <p:style>
+          <a:lnRef idx="2">
+            <a:schemeClr val="accent1">
+              <a:shade val="50000"/>
+            </a:schemeClr>
+          </a:lnRef>
+          <a:fillRef idx="1">
+            <a:schemeClr val="accent1"/>
+          </a:fillRef>
+          <a:effectRef idx="0">
+            <a:schemeClr val="accent1"/>
+          </a:effectRef>
+          <a:fontRef idx="minor">
+            <a:schemeClr val="lt1"/>
+          </a:fontRef>
+        </p:style>
+        <p:txBody>
+          <a:bodyPr rtlCol="0" anchor="ctr"/>
+          <a:lstStyle/>
+          <a:p>
+            <a:pPr algn="ctr"/>
+            <a:endParaRPr lang="en-US"/>
+          </a:p>
+        </p:txBody>
+      </p:sp>
+      <p:sp>
+        <p:nvSpPr>
+          <p:cNvPr id="4" name="TextBox 3"/>
+          <p:cNvSpPr txBox="1"/>
+          <p:nvPr/>
+        </p:nvSpPr>
+        <p:spPr>
+          <a:xfrm>
+            <a:off x="351563" y="125645"/>
+            <a:ext cx="7166837" cy="646331"/>
+          </a:xfrm>
+          <a:prstGeom prst="rect">
+            <a:avLst/>
+          </a:prstGeom>
+          <a:noFill/>
+        </p:spPr>
+        <p:txBody>
+          <a:bodyPr wrap="square" rtlCol="0">
+            <a:spAutoFit/>
+          </a:bodyPr>
+          <a:lstStyle/>
+          <a:p>
+            <a:r>
+              <a:rPr lang="en-US" sz="3600" dirty="0">
+                <a:solidFill>
+                  <a:schemeClr val="bg1"/>
+                </a:solidFill>
+                <a:latin typeface="Proxima Nova Lt" panose="02000506030000020004" pitchFamily="50" charset="0"/>
+                <a:ea typeface="Karla" pitchFamily="2" charset="0"/>
+              </a:rPr>
+              <a:t>Analysis Goals</a:t>
+            </a:r>
+          </a:p>
+        </p:txBody>
+      </p:sp>
+    </p:spTree>
+    <p:extLst>
+      <p:ext uri="{BB962C8B-B14F-4D97-AF65-F5344CB8AC3E}">
+        <p14:creationId xmlns:p14="http://schemas.microsoft.com/office/powerpoint/2010/main" val="2803589908"/>
+      </p:ext>
+    </p:extLst>
+  </p:cSld>
+  <p:clrMapOvr>
+    <a:masterClrMapping/>
+  </p:clrMapOvr>
+</p:sld>
+</file>
+
+<file path=ppt/slides/slide4.xml><?xml version="1.0" encoding="utf-8"?>
 <p:sld xmlns:a="http://schemas.openxmlformats.org/drawingml/2006/main" xmlns:r="http://schemas.openxmlformats.org/officeDocument/2006/relationships" xmlns:p="http://schemas.openxmlformats.org/presentationml/2006/main">
   <p:cSld>
     <p:spTree>
@@ -6554,7 +8606,7 @@
 </p:sld>
 </file>
 
-<file path=ppt/slides/slide3.xml><?xml version="1.0" encoding="utf-8"?>
+<file path=ppt/slides/slide5.xml><?xml version="1.0" encoding="utf-8"?>
 <p:sld xmlns:a="http://schemas.openxmlformats.org/drawingml/2006/main" xmlns:r="http://schemas.openxmlformats.org/officeDocument/2006/relationships" xmlns:p="http://schemas.openxmlformats.org/presentationml/2006/main">
   <p:cSld>
     <p:spTree>
@@ -6727,7 +8779,7 @@
 </p:sld>
 </file>
 
-<file path=ppt/slides/slide4.xml><?xml version="1.0" encoding="utf-8"?>
+<file path=ppt/slides/slide6.xml><?xml version="1.0" encoding="utf-8"?>
 <p:sld xmlns:a="http://schemas.openxmlformats.org/drawingml/2006/main" xmlns:r="http://schemas.openxmlformats.org/officeDocument/2006/relationships" xmlns:p="http://schemas.openxmlformats.org/presentationml/2006/main">
   <p:cSld>
     <p:bg>
@@ -7005,884 +9057,6 @@
 </p:sld>
 </file>
 
-<file path=ppt/slides/slide5.xml><?xml version="1.0" encoding="utf-8"?>
-<p:sld xmlns:a="http://schemas.openxmlformats.org/drawingml/2006/main" xmlns:r="http://schemas.openxmlformats.org/officeDocument/2006/relationships" xmlns:p="http://schemas.openxmlformats.org/presentationml/2006/main">
-  <p:cSld>
-    <p:spTree>
-      <p:nvGrpSpPr>
-        <p:cNvPr id="1" name=""/>
-        <p:cNvGrpSpPr/>
-        <p:nvPr/>
-      </p:nvGrpSpPr>
-      <p:grpSpPr>
-        <a:xfrm>
-          <a:off x="0" y="0"/>
-          <a:ext cx="0" cy="0"/>
-          <a:chOff x="0" y="0"/>
-          <a:chExt cx="0" cy="0"/>
-        </a:xfrm>
-      </p:grpSpPr>
-      <p:sp>
-        <p:nvSpPr>
-          <p:cNvPr id="49" name="TextBox 48"/>
-          <p:cNvSpPr txBox="1"/>
-          <p:nvPr/>
-        </p:nvSpPr>
-        <p:spPr>
-          <a:xfrm>
-            <a:off x="404480" y="2724000"/>
-            <a:ext cx="507831" cy="1410001"/>
-          </a:xfrm>
-          <a:prstGeom prst="rect">
-            <a:avLst/>
-          </a:prstGeom>
-          <a:noFill/>
-        </p:spPr>
-        <p:txBody>
-          <a:bodyPr vert="vert270" wrap="none" rtlCol="0">
-            <a:spAutoFit/>
-          </a:bodyPr>
-          <a:lstStyle/>
-          <a:p>
-            <a:pPr algn="ctr"/>
-            <a:r>
-              <a:rPr lang="en-US" sz="1200" b="1" dirty="0">
-                <a:latin typeface="Arial" panose="020B0604020202020204" pitchFamily="34" charset="0"/>
-                <a:cs typeface="Arial" panose="020B0604020202020204" pitchFamily="34" charset="0"/>
-              </a:rPr>
-              <a:t>Number of People</a:t>
-            </a:r>
-          </a:p>
-          <a:p>
-            <a:pPr algn="ctr"/>
-            <a:r>
-              <a:rPr lang="en-US" sz="900" dirty="0">
-                <a:latin typeface="Arial" panose="020B0604020202020204" pitchFamily="34" charset="0"/>
-                <a:cs typeface="Arial" panose="020B0604020202020204" pitchFamily="34" charset="0"/>
-              </a:rPr>
-              <a:t>(7-day Moving Average)</a:t>
-            </a:r>
-            <a:endParaRPr lang="en-US" sz="1400" dirty="0">
-              <a:latin typeface="Arial" panose="020B0604020202020204" pitchFamily="34" charset="0"/>
-              <a:cs typeface="Arial" panose="020B0604020202020204" pitchFamily="34" charset="0"/>
-            </a:endParaRPr>
-          </a:p>
-        </p:txBody>
-      </p:sp>
-      <p:pic>
-        <p:nvPicPr>
-          <p:cNvPr id="51" name="Picture 50"/>
-          <p:cNvPicPr>
-            <a:picLocks noChangeAspect="1"/>
-          </p:cNvPicPr>
-          <p:nvPr/>
-        </p:nvPicPr>
-        <p:blipFill rotWithShape="1">
-          <a:blip r:embed="rId2">
-            <a:extLst>
-              <a:ext uri="{28A0092B-C50C-407E-A947-70E740481C1C}">
-                <a14:useLocalDpi xmlns:a14="http://schemas.microsoft.com/office/drawing/2010/main" val="0"/>
-              </a:ext>
-            </a:extLst>
-          </a:blip>
-          <a:srcRect l="2222" t="3819" r="2086" b="3567"/>
-          <a:stretch/>
-        </p:blipFill>
-        <p:spPr>
-          <a:xfrm>
-            <a:off x="1055459" y="1072536"/>
-            <a:ext cx="10255250" cy="5293497"/>
-          </a:xfrm>
-          <a:prstGeom prst="rect">
-            <a:avLst/>
-          </a:prstGeom>
-        </p:spPr>
-      </p:pic>
-      <p:sp>
-        <p:nvSpPr>
-          <p:cNvPr id="53" name="TextBox 52"/>
-          <p:cNvSpPr txBox="1"/>
-          <p:nvPr/>
-        </p:nvSpPr>
-        <p:spPr>
-          <a:xfrm>
-            <a:off x="5823050" y="6411684"/>
-            <a:ext cx="647934" cy="276999"/>
-          </a:xfrm>
-          <a:prstGeom prst="rect">
-            <a:avLst/>
-          </a:prstGeom>
-          <a:noFill/>
-        </p:spPr>
-        <p:txBody>
-          <a:bodyPr wrap="none" rtlCol="0">
-            <a:spAutoFit/>
-          </a:bodyPr>
-          <a:lstStyle/>
-          <a:p>
-            <a:r>
-              <a:rPr lang="en-US" sz="1200" b="1" dirty="0">
-                <a:latin typeface="Arial" panose="020B0604020202020204" pitchFamily="34" charset="0"/>
-                <a:cs typeface="Arial" panose="020B0604020202020204" pitchFamily="34" charset="0"/>
-              </a:rPr>
-              <a:t>Month</a:t>
-            </a:r>
-            <a:endParaRPr lang="en-US" sz="1400" b="1" dirty="0">
-              <a:latin typeface="Arial" panose="020B0604020202020204" pitchFamily="34" charset="0"/>
-              <a:cs typeface="Arial" panose="020B0604020202020204" pitchFamily="34" charset="0"/>
-            </a:endParaRPr>
-          </a:p>
-        </p:txBody>
-      </p:sp>
-      <p:sp>
-        <p:nvSpPr>
-          <p:cNvPr id="64" name="TextBox 63"/>
-          <p:cNvSpPr txBox="1"/>
-          <p:nvPr/>
-        </p:nvSpPr>
-        <p:spPr>
-          <a:xfrm>
-            <a:off x="968375" y="264531"/>
-            <a:ext cx="5178311" cy="461665"/>
-          </a:xfrm>
-          <a:prstGeom prst="rect">
-            <a:avLst/>
-          </a:prstGeom>
-          <a:noFill/>
-        </p:spPr>
-        <p:txBody>
-          <a:bodyPr wrap="square" rtlCol="0">
-            <a:spAutoFit/>
-          </a:bodyPr>
-          <a:lstStyle/>
-          <a:p>
-            <a:r>
-              <a:rPr lang="en-US" sz="2400" dirty="0">
-                <a:latin typeface="Futura-Normal" pitchFamily="2" charset="0"/>
-              </a:rPr>
-              <a:t>UC Berkeley 2015-16 Gym Attendance</a:t>
-            </a:r>
-          </a:p>
-        </p:txBody>
-      </p:sp>
-      <p:sp>
-        <p:nvSpPr>
-          <p:cNvPr id="66" name="TextBox 65"/>
-          <p:cNvSpPr txBox="1"/>
-          <p:nvPr/>
-        </p:nvSpPr>
-        <p:spPr>
-          <a:xfrm>
-            <a:off x="2023091" y="3516084"/>
-            <a:ext cx="1621523" cy="838691"/>
-          </a:xfrm>
-          <a:prstGeom prst="rect">
-            <a:avLst/>
-          </a:prstGeom>
-          <a:noFill/>
-        </p:spPr>
-        <p:txBody>
-          <a:bodyPr wrap="square" rtlCol="0">
-            <a:spAutoFit/>
-          </a:bodyPr>
-          <a:lstStyle/>
-          <a:p>
-            <a:pPr>
-              <a:spcAft>
-                <a:spcPts val="100"/>
-              </a:spcAft>
-            </a:pPr>
-            <a:r>
-              <a:rPr lang="en-US" sz="1200" b="1" dirty="0">
-                <a:latin typeface="Century Gothic" panose="020B0502020202020204" pitchFamily="34" charset="0"/>
-                <a:cs typeface="Arial" panose="020B0604020202020204" pitchFamily="34" charset="0"/>
-              </a:rPr>
-              <a:t>Thanksgiving</a:t>
-            </a:r>
-          </a:p>
-          <a:p>
-            <a:pPr>
-              <a:spcAft>
-                <a:spcPts val="200"/>
-              </a:spcAft>
-            </a:pPr>
-            <a:r>
-              <a:rPr lang="en-US" sz="1000" dirty="0">
-                <a:latin typeface="Century Gothic" panose="020B0502020202020204" pitchFamily="34" charset="0"/>
-                <a:cs typeface="Arial" panose="020B0604020202020204" pitchFamily="34" charset="0"/>
-              </a:rPr>
-              <a:t>Nov 26 2015</a:t>
-            </a:r>
-          </a:p>
-          <a:p>
-            <a:r>
-              <a:rPr lang="en-US" sz="800" i="1" dirty="0">
-                <a:latin typeface="Century Gothic" panose="020B0502020202020204" pitchFamily="34" charset="0"/>
-                <a:cs typeface="Arial" panose="020B0604020202020204" pitchFamily="34" charset="0"/>
-              </a:rPr>
-              <a:t>Working out is optional when you’re filling up on turkey and mashed potatoes</a:t>
-            </a:r>
-          </a:p>
-        </p:txBody>
-      </p:sp>
-      <p:cxnSp>
-        <p:nvCxnSpPr>
-          <p:cNvPr id="67" name="Straight Arrow Connector 66"/>
-          <p:cNvCxnSpPr>
-            <a:cxnSpLocks/>
-          </p:cNvCxnSpPr>
-          <p:nvPr/>
-        </p:nvCxnSpPr>
-        <p:spPr>
-          <a:xfrm flipV="1">
-            <a:off x="3249384" y="3601809"/>
-            <a:ext cx="926306" cy="219076"/>
-          </a:xfrm>
-          <a:prstGeom prst="straightConnector1">
-            <a:avLst/>
-          </a:prstGeom>
-          <a:ln>
-            <a:tailEnd type="triangle"/>
-          </a:ln>
-        </p:spPr>
-        <p:style>
-          <a:lnRef idx="1">
-            <a:schemeClr val="accent1"/>
-          </a:lnRef>
-          <a:fillRef idx="0">
-            <a:schemeClr val="accent1"/>
-          </a:fillRef>
-          <a:effectRef idx="0">
-            <a:schemeClr val="accent1"/>
-          </a:effectRef>
-          <a:fontRef idx="minor">
-            <a:schemeClr val="tx1"/>
-          </a:fontRef>
-        </p:style>
-      </p:cxnSp>
-      <p:sp>
-        <p:nvSpPr>
-          <p:cNvPr id="85" name="TextBox 84"/>
-          <p:cNvSpPr txBox="1"/>
-          <p:nvPr/>
-        </p:nvSpPr>
-        <p:spPr>
-          <a:xfrm>
-            <a:off x="3103334" y="1105594"/>
-            <a:ext cx="1481366" cy="715581"/>
-          </a:xfrm>
-          <a:prstGeom prst="rect">
-            <a:avLst/>
-          </a:prstGeom>
-          <a:noFill/>
-          <a:ln>
-            <a:noFill/>
-          </a:ln>
-        </p:spPr>
-        <p:txBody>
-          <a:bodyPr wrap="square" rtlCol="0">
-            <a:spAutoFit/>
-          </a:bodyPr>
-          <a:lstStyle/>
-          <a:p>
-            <a:pPr>
-              <a:spcAft>
-                <a:spcPts val="100"/>
-              </a:spcAft>
-            </a:pPr>
-            <a:r>
-              <a:rPr lang="en-US" sz="1200" b="1" dirty="0">
-                <a:solidFill>
-                  <a:schemeClr val="bg2">
-                    <a:lumMod val="90000"/>
-                  </a:schemeClr>
-                </a:solidFill>
-                <a:latin typeface="Century Gothic" panose="020B0502020202020204" pitchFamily="34" charset="0"/>
-                <a:cs typeface="Arial" panose="020B0604020202020204" pitchFamily="34" charset="0"/>
-              </a:rPr>
-              <a:t>School Begins</a:t>
-            </a:r>
-          </a:p>
-          <a:p>
-            <a:pPr>
-              <a:spcAft>
-                <a:spcPts val="200"/>
-              </a:spcAft>
-            </a:pPr>
-            <a:r>
-              <a:rPr lang="en-US" sz="1000" dirty="0">
-                <a:solidFill>
-                  <a:schemeClr val="bg2">
-                    <a:lumMod val="90000"/>
-                  </a:schemeClr>
-                </a:solidFill>
-                <a:latin typeface="Century Gothic" panose="020B0502020202020204" pitchFamily="34" charset="0"/>
-                <a:cs typeface="Arial" panose="020B0604020202020204" pitchFamily="34" charset="0"/>
-              </a:rPr>
-              <a:t>Aug 26, 2016</a:t>
-            </a:r>
-          </a:p>
-          <a:p>
-            <a:r>
-              <a:rPr lang="en-US" sz="800" i="1" dirty="0">
-                <a:solidFill>
-                  <a:schemeClr val="bg2">
-                    <a:lumMod val="90000"/>
-                  </a:schemeClr>
-                </a:solidFill>
-                <a:latin typeface="Century Gothic" panose="020B0502020202020204" pitchFamily="34" charset="0"/>
-                <a:cs typeface="Arial" panose="020B0604020202020204" pitchFamily="34" charset="0"/>
-              </a:rPr>
-              <a:t>Every freshman is in the gym until next week</a:t>
-            </a:r>
-          </a:p>
-        </p:txBody>
-      </p:sp>
-      <p:cxnSp>
-        <p:nvCxnSpPr>
-          <p:cNvPr id="86" name="Straight Arrow Connector 85"/>
-          <p:cNvCxnSpPr>
-            <a:cxnSpLocks/>
-          </p:cNvCxnSpPr>
-          <p:nvPr/>
-        </p:nvCxnSpPr>
-        <p:spPr>
-          <a:xfrm flipH="1">
-            <a:off x="2126456" y="1450359"/>
-            <a:ext cx="976878" cy="111741"/>
-          </a:xfrm>
-          <a:prstGeom prst="straightConnector1">
-            <a:avLst/>
-          </a:prstGeom>
-          <a:ln>
-            <a:solidFill>
-              <a:schemeClr val="bg2"/>
-            </a:solidFill>
-            <a:tailEnd type="triangle"/>
-          </a:ln>
-        </p:spPr>
-        <p:style>
-          <a:lnRef idx="1">
-            <a:schemeClr val="accent1"/>
-          </a:lnRef>
-          <a:fillRef idx="0">
-            <a:schemeClr val="accent1"/>
-          </a:fillRef>
-          <a:effectRef idx="0">
-            <a:schemeClr val="accent1"/>
-          </a:effectRef>
-          <a:fontRef idx="minor">
-            <a:schemeClr val="tx1"/>
-          </a:fontRef>
-        </p:style>
-      </p:cxnSp>
-    </p:spTree>
-    <p:extLst>
-      <p:ext uri="{BB962C8B-B14F-4D97-AF65-F5344CB8AC3E}">
-        <p14:creationId xmlns:p14="http://schemas.microsoft.com/office/powerpoint/2010/main" val="1840922421"/>
-      </p:ext>
-    </p:extLst>
-  </p:cSld>
-  <p:clrMapOvr>
-    <a:masterClrMapping/>
-  </p:clrMapOvr>
-</p:sld>
-</file>
-
-<file path=ppt/slides/slide6.xml><?xml version="1.0" encoding="utf-8"?>
-<p:sld xmlns:a="http://schemas.openxmlformats.org/drawingml/2006/main" xmlns:r="http://schemas.openxmlformats.org/officeDocument/2006/relationships" xmlns:p="http://schemas.openxmlformats.org/presentationml/2006/main">
-  <p:cSld>
-    <p:spTree>
-      <p:nvGrpSpPr>
-        <p:cNvPr id="1" name=""/>
-        <p:cNvGrpSpPr/>
-        <p:nvPr/>
-      </p:nvGrpSpPr>
-      <p:grpSpPr>
-        <a:xfrm>
-          <a:off x="0" y="0"/>
-          <a:ext cx="0" cy="0"/>
-          <a:chOff x="0" y="0"/>
-          <a:chExt cx="0" cy="0"/>
-        </a:xfrm>
-      </p:grpSpPr>
-      <p:sp>
-        <p:nvSpPr>
-          <p:cNvPr id="49" name="TextBox 48"/>
-          <p:cNvSpPr txBox="1"/>
-          <p:nvPr/>
-        </p:nvSpPr>
-        <p:spPr>
-          <a:xfrm>
-            <a:off x="404480" y="2724000"/>
-            <a:ext cx="507831" cy="1410001"/>
-          </a:xfrm>
-          <a:prstGeom prst="rect">
-            <a:avLst/>
-          </a:prstGeom>
-          <a:noFill/>
-        </p:spPr>
-        <p:txBody>
-          <a:bodyPr vert="vert270" wrap="none" rtlCol="0">
-            <a:spAutoFit/>
-          </a:bodyPr>
-          <a:lstStyle/>
-          <a:p>
-            <a:pPr algn="ctr"/>
-            <a:r>
-              <a:rPr lang="en-US" sz="1200" b="1" dirty="0">
-                <a:latin typeface="Arial" panose="020B0604020202020204" pitchFamily="34" charset="0"/>
-                <a:cs typeface="Arial" panose="020B0604020202020204" pitchFamily="34" charset="0"/>
-              </a:rPr>
-              <a:t>Number of People</a:t>
-            </a:r>
-          </a:p>
-          <a:p>
-            <a:pPr algn="ctr"/>
-            <a:r>
-              <a:rPr lang="en-US" sz="900" dirty="0">
-                <a:latin typeface="Arial" panose="020B0604020202020204" pitchFamily="34" charset="0"/>
-                <a:cs typeface="Arial" panose="020B0604020202020204" pitchFamily="34" charset="0"/>
-              </a:rPr>
-              <a:t>(7-day Moving Average)</a:t>
-            </a:r>
-            <a:endParaRPr lang="en-US" sz="1400" dirty="0">
-              <a:latin typeface="Arial" panose="020B0604020202020204" pitchFamily="34" charset="0"/>
-              <a:cs typeface="Arial" panose="020B0604020202020204" pitchFamily="34" charset="0"/>
-            </a:endParaRPr>
-          </a:p>
-        </p:txBody>
-      </p:sp>
-      <p:pic>
-        <p:nvPicPr>
-          <p:cNvPr id="51" name="Picture 50"/>
-          <p:cNvPicPr>
-            <a:picLocks noChangeAspect="1"/>
-          </p:cNvPicPr>
-          <p:nvPr/>
-        </p:nvPicPr>
-        <p:blipFill rotWithShape="1">
-          <a:blip r:embed="rId2">
-            <a:extLst>
-              <a:ext uri="{28A0092B-C50C-407E-A947-70E740481C1C}">
-                <a14:useLocalDpi xmlns:a14="http://schemas.microsoft.com/office/drawing/2010/main" val="0"/>
-              </a:ext>
-            </a:extLst>
-          </a:blip>
-          <a:srcRect l="2222" t="3819" r="2086" b="3567"/>
-          <a:stretch/>
-        </p:blipFill>
-        <p:spPr>
-          <a:xfrm>
-            <a:off x="1055459" y="1072536"/>
-            <a:ext cx="10255250" cy="5293497"/>
-          </a:xfrm>
-          <a:prstGeom prst="rect">
-            <a:avLst/>
-          </a:prstGeom>
-        </p:spPr>
-      </p:pic>
-      <p:sp>
-        <p:nvSpPr>
-          <p:cNvPr id="53" name="TextBox 52"/>
-          <p:cNvSpPr txBox="1"/>
-          <p:nvPr/>
-        </p:nvSpPr>
-        <p:spPr>
-          <a:xfrm>
-            <a:off x="5823050" y="6411684"/>
-            <a:ext cx="647934" cy="276999"/>
-          </a:xfrm>
-          <a:prstGeom prst="rect">
-            <a:avLst/>
-          </a:prstGeom>
-          <a:noFill/>
-        </p:spPr>
-        <p:txBody>
-          <a:bodyPr wrap="none" rtlCol="0">
-            <a:spAutoFit/>
-          </a:bodyPr>
-          <a:lstStyle/>
-          <a:p>
-            <a:r>
-              <a:rPr lang="en-US" sz="1200" b="1" dirty="0">
-                <a:latin typeface="Arial" panose="020B0604020202020204" pitchFamily="34" charset="0"/>
-                <a:cs typeface="Arial" panose="020B0604020202020204" pitchFamily="34" charset="0"/>
-              </a:rPr>
-              <a:t>Month</a:t>
-            </a:r>
-            <a:endParaRPr lang="en-US" sz="1400" b="1" dirty="0">
-              <a:latin typeface="Arial" panose="020B0604020202020204" pitchFamily="34" charset="0"/>
-              <a:cs typeface="Arial" panose="020B0604020202020204" pitchFamily="34" charset="0"/>
-            </a:endParaRPr>
-          </a:p>
-        </p:txBody>
-      </p:sp>
-      <p:cxnSp>
-        <p:nvCxnSpPr>
-          <p:cNvPr id="61" name="Straight Arrow Connector 60"/>
-          <p:cNvCxnSpPr>
-            <a:cxnSpLocks/>
-          </p:cNvCxnSpPr>
-          <p:nvPr/>
-        </p:nvCxnSpPr>
-        <p:spPr>
-          <a:xfrm flipV="1">
-            <a:off x="4584700" y="4626041"/>
-            <a:ext cx="317272" cy="382366"/>
-          </a:xfrm>
-          <a:prstGeom prst="straightConnector1">
-            <a:avLst/>
-          </a:prstGeom>
-          <a:ln>
-            <a:tailEnd type="triangle"/>
-          </a:ln>
-        </p:spPr>
-        <p:style>
-          <a:lnRef idx="1">
-            <a:schemeClr val="accent1"/>
-          </a:lnRef>
-          <a:fillRef idx="0">
-            <a:schemeClr val="accent1"/>
-          </a:fillRef>
-          <a:effectRef idx="0">
-            <a:schemeClr val="accent1"/>
-          </a:effectRef>
-          <a:fontRef idx="minor">
-            <a:schemeClr val="tx1"/>
-          </a:fontRef>
-        </p:style>
-      </p:cxnSp>
-      <p:sp>
-        <p:nvSpPr>
-          <p:cNvPr id="64" name="TextBox 63"/>
-          <p:cNvSpPr txBox="1"/>
-          <p:nvPr/>
-        </p:nvSpPr>
-        <p:spPr>
-          <a:xfrm>
-            <a:off x="968375" y="264531"/>
-            <a:ext cx="5178311" cy="461665"/>
-          </a:xfrm>
-          <a:prstGeom prst="rect">
-            <a:avLst/>
-          </a:prstGeom>
-          <a:noFill/>
-        </p:spPr>
-        <p:txBody>
-          <a:bodyPr wrap="square" rtlCol="0">
-            <a:spAutoFit/>
-          </a:bodyPr>
-          <a:lstStyle/>
-          <a:p>
-            <a:r>
-              <a:rPr lang="en-US" sz="2400" dirty="0">
-                <a:latin typeface="Futura-Normal" pitchFamily="2" charset="0"/>
-              </a:rPr>
-              <a:t>UC Berkeley 2015-16 Gym Attendance</a:t>
-            </a:r>
-          </a:p>
-        </p:txBody>
-      </p:sp>
-      <p:sp>
-        <p:nvSpPr>
-          <p:cNvPr id="65" name="TextBox 64"/>
-          <p:cNvSpPr txBox="1"/>
-          <p:nvPr/>
-        </p:nvSpPr>
-        <p:spPr>
-          <a:xfrm>
-            <a:off x="3539744" y="5008407"/>
-            <a:ext cx="1617448" cy="838691"/>
-          </a:xfrm>
-          <a:prstGeom prst="rect">
-            <a:avLst/>
-          </a:prstGeom>
-          <a:noFill/>
-        </p:spPr>
-        <p:txBody>
-          <a:bodyPr wrap="square" rtlCol="0">
-            <a:spAutoFit/>
-          </a:bodyPr>
-          <a:lstStyle/>
-          <a:p>
-            <a:pPr>
-              <a:spcAft>
-                <a:spcPts val="100"/>
-              </a:spcAft>
-            </a:pPr>
-            <a:r>
-              <a:rPr lang="en-US" sz="1200" b="1" dirty="0">
-                <a:latin typeface="Century Gothic" panose="020B0502020202020204" pitchFamily="34" charset="0"/>
-                <a:cs typeface="Arial" panose="020B0604020202020204" pitchFamily="34" charset="0"/>
-              </a:rPr>
-              <a:t>Winter Break</a:t>
-            </a:r>
-          </a:p>
-          <a:p>
-            <a:pPr>
-              <a:spcAft>
-                <a:spcPts val="200"/>
-              </a:spcAft>
-            </a:pPr>
-            <a:r>
-              <a:rPr lang="en-US" sz="1000" dirty="0">
-                <a:latin typeface="Century Gothic" panose="020B0502020202020204" pitchFamily="34" charset="0"/>
-                <a:cs typeface="Arial" panose="020B0604020202020204" pitchFamily="34" charset="0"/>
-              </a:rPr>
-              <a:t>Dec 19-Jan 19, 2015</a:t>
-            </a:r>
-          </a:p>
-          <a:p>
-            <a:r>
-              <a:rPr lang="en-US" sz="800" i="1" dirty="0">
-                <a:latin typeface="Century Gothic" panose="020B0502020202020204" pitchFamily="34" charset="0"/>
-                <a:cs typeface="Arial" panose="020B0604020202020204" pitchFamily="34" charset="0"/>
-              </a:rPr>
-              <a:t>Most students head home for the winter holidays, like Christmas and Hanukkah</a:t>
-            </a:r>
-          </a:p>
-        </p:txBody>
-      </p:sp>
-      <p:sp>
-        <p:nvSpPr>
-          <p:cNvPr id="66" name="TextBox 65"/>
-          <p:cNvSpPr txBox="1"/>
-          <p:nvPr/>
-        </p:nvSpPr>
-        <p:spPr>
-          <a:xfrm>
-            <a:off x="2023091" y="3516084"/>
-            <a:ext cx="1621523" cy="838691"/>
-          </a:xfrm>
-          <a:prstGeom prst="rect">
-            <a:avLst/>
-          </a:prstGeom>
-          <a:noFill/>
-        </p:spPr>
-        <p:txBody>
-          <a:bodyPr wrap="square" rtlCol="0">
-            <a:spAutoFit/>
-          </a:bodyPr>
-          <a:lstStyle/>
-          <a:p>
-            <a:pPr>
-              <a:spcAft>
-                <a:spcPts val="100"/>
-              </a:spcAft>
-            </a:pPr>
-            <a:r>
-              <a:rPr lang="en-US" sz="1200" b="1" dirty="0">
-                <a:solidFill>
-                  <a:schemeClr val="bg2">
-                    <a:lumMod val="90000"/>
-                  </a:schemeClr>
-                </a:solidFill>
-                <a:latin typeface="Century Gothic" panose="020B0502020202020204" pitchFamily="34" charset="0"/>
-                <a:cs typeface="Arial" panose="020B0604020202020204" pitchFamily="34" charset="0"/>
-              </a:rPr>
-              <a:t>Thanksgiving</a:t>
-            </a:r>
-          </a:p>
-          <a:p>
-            <a:pPr>
-              <a:spcAft>
-                <a:spcPts val="200"/>
-              </a:spcAft>
-            </a:pPr>
-            <a:r>
-              <a:rPr lang="en-US" sz="1000" dirty="0">
-                <a:solidFill>
-                  <a:schemeClr val="bg2">
-                    <a:lumMod val="90000"/>
-                  </a:schemeClr>
-                </a:solidFill>
-                <a:latin typeface="Century Gothic" panose="020B0502020202020204" pitchFamily="34" charset="0"/>
-                <a:cs typeface="Arial" panose="020B0604020202020204" pitchFamily="34" charset="0"/>
-              </a:rPr>
-              <a:t>Nov 26 2015</a:t>
-            </a:r>
-          </a:p>
-          <a:p>
-            <a:r>
-              <a:rPr lang="en-US" sz="800" i="1" dirty="0">
-                <a:solidFill>
-                  <a:schemeClr val="bg2">
-                    <a:lumMod val="90000"/>
-                  </a:schemeClr>
-                </a:solidFill>
-                <a:latin typeface="Century Gothic" panose="020B0502020202020204" pitchFamily="34" charset="0"/>
-                <a:cs typeface="Arial" panose="020B0604020202020204" pitchFamily="34" charset="0"/>
-              </a:rPr>
-              <a:t>Working out is optional when you’re filling up on turkey and mashed potatoes</a:t>
-            </a:r>
-          </a:p>
-        </p:txBody>
-      </p:sp>
-      <p:cxnSp>
-        <p:nvCxnSpPr>
-          <p:cNvPr id="67" name="Straight Arrow Connector 66"/>
-          <p:cNvCxnSpPr>
-            <a:cxnSpLocks/>
-          </p:cNvCxnSpPr>
-          <p:nvPr/>
-        </p:nvCxnSpPr>
-        <p:spPr>
-          <a:xfrm flipV="1">
-            <a:off x="3249384" y="3601809"/>
-            <a:ext cx="926306" cy="219076"/>
-          </a:xfrm>
-          <a:prstGeom prst="straightConnector1">
-            <a:avLst/>
-          </a:prstGeom>
-          <a:ln>
-            <a:solidFill>
-              <a:schemeClr val="bg2"/>
-            </a:solidFill>
-            <a:tailEnd type="triangle"/>
-          </a:ln>
-        </p:spPr>
-        <p:style>
-          <a:lnRef idx="1">
-            <a:schemeClr val="accent1"/>
-          </a:lnRef>
-          <a:fillRef idx="0">
-            <a:schemeClr val="accent1"/>
-          </a:fillRef>
-          <a:effectRef idx="0">
-            <a:schemeClr val="accent1"/>
-          </a:effectRef>
-          <a:fontRef idx="minor">
-            <a:schemeClr val="tx1"/>
-          </a:fontRef>
-        </p:style>
-      </p:cxnSp>
-      <p:sp>
-        <p:nvSpPr>
-          <p:cNvPr id="85" name="TextBox 84"/>
-          <p:cNvSpPr txBox="1"/>
-          <p:nvPr/>
-        </p:nvSpPr>
-        <p:spPr>
-          <a:xfrm>
-            <a:off x="3103334" y="1105594"/>
-            <a:ext cx="1481366" cy="715581"/>
-          </a:xfrm>
-          <a:prstGeom prst="rect">
-            <a:avLst/>
-          </a:prstGeom>
-          <a:noFill/>
-        </p:spPr>
-        <p:txBody>
-          <a:bodyPr wrap="square" rtlCol="0">
-            <a:spAutoFit/>
-          </a:bodyPr>
-          <a:lstStyle/>
-          <a:p>
-            <a:pPr>
-              <a:spcAft>
-                <a:spcPts val="100"/>
-              </a:spcAft>
-            </a:pPr>
-            <a:r>
-              <a:rPr lang="en-US" sz="1200" b="1" dirty="0">
-                <a:solidFill>
-                  <a:schemeClr val="bg2">
-                    <a:lumMod val="90000"/>
-                  </a:schemeClr>
-                </a:solidFill>
-                <a:latin typeface="Century Gothic" panose="020B0502020202020204" pitchFamily="34" charset="0"/>
-                <a:cs typeface="Arial" panose="020B0604020202020204" pitchFamily="34" charset="0"/>
-              </a:rPr>
-              <a:t>School Begins</a:t>
-            </a:r>
-          </a:p>
-          <a:p>
-            <a:pPr>
-              <a:spcAft>
-                <a:spcPts val="200"/>
-              </a:spcAft>
-            </a:pPr>
-            <a:r>
-              <a:rPr lang="en-US" sz="1000" dirty="0">
-                <a:solidFill>
-                  <a:schemeClr val="bg2">
-                    <a:lumMod val="90000"/>
-                  </a:schemeClr>
-                </a:solidFill>
-                <a:latin typeface="Century Gothic" panose="020B0502020202020204" pitchFamily="34" charset="0"/>
-                <a:cs typeface="Arial" panose="020B0604020202020204" pitchFamily="34" charset="0"/>
-              </a:rPr>
-              <a:t>Aug 26, 2016</a:t>
-            </a:r>
-          </a:p>
-          <a:p>
-            <a:r>
-              <a:rPr lang="en-US" sz="800" i="1" dirty="0">
-                <a:solidFill>
-                  <a:schemeClr val="bg2">
-                    <a:lumMod val="90000"/>
-                  </a:schemeClr>
-                </a:solidFill>
-                <a:latin typeface="Century Gothic" panose="020B0502020202020204" pitchFamily="34" charset="0"/>
-                <a:cs typeface="Arial" panose="020B0604020202020204" pitchFamily="34" charset="0"/>
-              </a:rPr>
-              <a:t>Every freshman is in the gym until next week</a:t>
-            </a:r>
-          </a:p>
-        </p:txBody>
-      </p:sp>
-      <p:cxnSp>
-        <p:nvCxnSpPr>
-          <p:cNvPr id="86" name="Straight Arrow Connector 85"/>
-          <p:cNvCxnSpPr>
-            <a:cxnSpLocks/>
-          </p:cNvCxnSpPr>
-          <p:nvPr/>
-        </p:nvCxnSpPr>
-        <p:spPr>
-          <a:xfrm flipH="1">
-            <a:off x="2126456" y="1450359"/>
-            <a:ext cx="976878" cy="111741"/>
-          </a:xfrm>
-          <a:prstGeom prst="straightConnector1">
-            <a:avLst/>
-          </a:prstGeom>
-          <a:ln>
-            <a:solidFill>
-              <a:schemeClr val="bg2"/>
-            </a:solidFill>
-            <a:tailEnd type="triangle"/>
-          </a:ln>
-        </p:spPr>
-        <p:style>
-          <a:lnRef idx="1">
-            <a:schemeClr val="accent1"/>
-          </a:lnRef>
-          <a:fillRef idx="0">
-            <a:schemeClr val="accent1"/>
-          </a:fillRef>
-          <a:effectRef idx="0">
-            <a:schemeClr val="accent1"/>
-          </a:effectRef>
-          <a:fontRef idx="minor">
-            <a:schemeClr val="tx1"/>
-          </a:fontRef>
-        </p:style>
-      </p:cxnSp>
-    </p:spTree>
-    <p:extLst>
-      <p:ext uri="{BB962C8B-B14F-4D97-AF65-F5344CB8AC3E}">
-        <p14:creationId xmlns:p14="http://schemas.microsoft.com/office/powerpoint/2010/main" val="2914679269"/>
-      </p:ext>
-    </p:extLst>
-  </p:cSld>
-  <p:clrMapOvr>
-    <a:masterClrMapping/>
-  </p:clrMapOvr>
-</p:sld>
-</file>
-
 <file path=ppt/slides/slide7.xml><?xml version="1.0" encoding="utf-8"?>
 <p:sld xmlns:a="http://schemas.openxmlformats.org/drawingml/2006/main" xmlns:r="http://schemas.openxmlformats.org/officeDocument/2006/relationships" xmlns:p="http://schemas.openxmlformats.org/presentationml/2006/main">
   <p:cSld>
@@ -8014,14 +9188,45 @@
       </p:sp>
       <p:sp>
         <p:nvSpPr>
-          <p:cNvPr id="54" name="TextBox 53"/>
+          <p:cNvPr id="64" name="TextBox 63"/>
           <p:cNvSpPr txBox="1"/>
           <p:nvPr/>
         </p:nvSpPr>
         <p:spPr>
           <a:xfrm>
-            <a:off x="6678270" y="1168985"/>
-            <a:ext cx="1994014" cy="851515"/>
+            <a:off x="968375" y="264531"/>
+            <a:ext cx="5178311" cy="461665"/>
+          </a:xfrm>
+          <a:prstGeom prst="rect">
+            <a:avLst/>
+          </a:prstGeom>
+          <a:noFill/>
+        </p:spPr>
+        <p:txBody>
+          <a:bodyPr wrap="square" rtlCol="0">
+            <a:spAutoFit/>
+          </a:bodyPr>
+          <a:lstStyle/>
+          <a:p>
+            <a:r>
+              <a:rPr lang="en-US" sz="2400" dirty="0">
+                <a:latin typeface="Futura-Normal" pitchFamily="2" charset="0"/>
+              </a:rPr>
+              <a:t>UC Berkeley 2015-16 Gym Attendance</a:t>
+            </a:r>
+          </a:p>
+        </p:txBody>
+      </p:sp>
+      <p:sp>
+        <p:nvSpPr>
+          <p:cNvPr id="66" name="TextBox 65"/>
+          <p:cNvSpPr txBox="1"/>
+          <p:nvPr/>
+        </p:nvSpPr>
+        <p:spPr>
+          <a:xfrm>
+            <a:off x="2023091" y="3516084"/>
+            <a:ext cx="1621523" cy="838691"/>
           </a:xfrm>
           <a:prstGeom prst="rect">
             <a:avLst/>
@@ -8044,7 +9249,7 @@
                 <a:latin typeface="Century Gothic" panose="020B0502020202020204" pitchFamily="34" charset="0"/>
                 <a:cs typeface="Arial" panose="020B0604020202020204" pitchFamily="34" charset="0"/>
               </a:rPr>
-              <a:t>New Year’s Gym Rush</a:t>
+              <a:t>Thanksgiving</a:t>
             </a:r>
           </a:p>
           <a:p>
@@ -8058,7 +9263,7 @@
                 <a:latin typeface="Century Gothic" panose="020B0502020202020204" pitchFamily="34" charset="0"/>
                 <a:cs typeface="Arial" panose="020B0604020202020204" pitchFamily="34" charset="0"/>
               </a:rPr>
-              <a:t>Jan 20, 2016</a:t>
+              <a:t>Nov 26 2015</a:t>
             </a:r>
           </a:p>
           <a:p>
@@ -8067,23 +9272,23 @@
                 <a:latin typeface="Century Gothic" panose="020B0502020202020204" pitchFamily="34" charset="0"/>
                 <a:cs typeface="Arial" panose="020B0604020202020204" pitchFamily="34" charset="0"/>
               </a:rPr>
-              <a:t>Students flood to the gym in a futile attempt to fulfill their New Year’s goals</a:t>
+              <a:t>Working out is optional when you’re filling up on turkey and mashed potatoes</a:t>
             </a:r>
           </a:p>
         </p:txBody>
       </p:sp>
       <p:cxnSp>
         <p:nvCxnSpPr>
-          <p:cNvPr id="60" name="Straight Arrow Connector 59"/>
+          <p:cNvPr id="67" name="Straight Arrow Connector 66"/>
           <p:cNvCxnSpPr>
             <a:cxnSpLocks/>
           </p:cNvCxnSpPr>
           <p:nvPr/>
         </p:nvCxnSpPr>
         <p:spPr>
-          <a:xfrm flipH="1">
-            <a:off x="5741759" y="1433497"/>
-            <a:ext cx="974611" cy="33724"/>
+          <a:xfrm flipV="1">
+            <a:off x="3249384" y="3601809"/>
+            <a:ext cx="926306" cy="219076"/>
           </a:xfrm>
           <a:prstGeom prst="straightConnector1">
             <a:avLst/>
@@ -8107,85 +9312,16 @@
           </a:fontRef>
         </p:style>
       </p:cxnSp>
-      <p:cxnSp>
-        <p:nvCxnSpPr>
-          <p:cNvPr id="61" name="Straight Arrow Connector 60"/>
-          <p:cNvCxnSpPr>
-            <a:cxnSpLocks/>
-          </p:cNvCxnSpPr>
-          <p:nvPr/>
-        </p:nvCxnSpPr>
-        <p:spPr>
-          <a:xfrm flipV="1">
-            <a:off x="4584700" y="4626041"/>
-            <a:ext cx="317272" cy="382366"/>
-          </a:xfrm>
-          <a:prstGeom prst="straightConnector1">
-            <a:avLst/>
-          </a:prstGeom>
-          <a:ln>
-            <a:solidFill>
-              <a:schemeClr val="bg2"/>
-            </a:solidFill>
-            <a:tailEnd type="triangle"/>
-          </a:ln>
-        </p:spPr>
-        <p:style>
-          <a:lnRef idx="1">
-            <a:schemeClr val="accent1"/>
-          </a:lnRef>
-          <a:fillRef idx="0">
-            <a:schemeClr val="accent1"/>
-          </a:fillRef>
-          <a:effectRef idx="0">
-            <a:schemeClr val="accent1"/>
-          </a:effectRef>
-          <a:fontRef idx="minor">
-            <a:schemeClr val="tx1"/>
-          </a:fontRef>
-        </p:style>
-      </p:cxnSp>
-      <p:sp>
-        <p:nvSpPr>
-          <p:cNvPr id="64" name="TextBox 63"/>
+      <p:sp>
+        <p:nvSpPr>
+          <p:cNvPr id="85" name="TextBox 84"/>
           <p:cNvSpPr txBox="1"/>
           <p:nvPr/>
         </p:nvSpPr>
         <p:spPr>
           <a:xfrm>
-            <a:off x="968375" y="264531"/>
-            <a:ext cx="5178311" cy="461665"/>
-          </a:xfrm>
-          <a:prstGeom prst="rect">
-            <a:avLst/>
-          </a:prstGeom>
-          <a:noFill/>
-        </p:spPr>
-        <p:txBody>
-          <a:bodyPr wrap="square" rtlCol="0">
-            <a:spAutoFit/>
-          </a:bodyPr>
-          <a:lstStyle/>
-          <a:p>
-            <a:r>
-              <a:rPr lang="en-US" sz="2400" dirty="0">
-                <a:latin typeface="Futura-Normal" pitchFamily="2" charset="0"/>
-              </a:rPr>
-              <a:t>UC Berkeley 2015-16 Gym Attendance</a:t>
-            </a:r>
-          </a:p>
-        </p:txBody>
-      </p:sp>
-      <p:sp>
-        <p:nvSpPr>
-          <p:cNvPr id="65" name="TextBox 64"/>
-          <p:cNvSpPr txBox="1"/>
-          <p:nvPr/>
-        </p:nvSpPr>
-        <p:spPr>
-          <a:xfrm>
-            <a:off x="3539744" y="5008407"/>
-            <a:ext cx="1617448" cy="838691"/>
+            <a:off x="3103334" y="1105594"/>
+            <a:ext cx="1481366" cy="715581"/>
           </a:xfrm>
           <a:prstGeom prst="rect">
             <a:avLst/>
@@ -8194,194 +9330,6 @@
           <a:ln>
             <a:noFill/>
           </a:ln>
-        </p:spPr>
-        <p:txBody>
-          <a:bodyPr wrap="square" rtlCol="0">
-            <a:spAutoFit/>
-          </a:bodyPr>
-          <a:lstStyle/>
-          <a:p>
-            <a:pPr>
-              <a:spcAft>
-                <a:spcPts val="100"/>
-              </a:spcAft>
-            </a:pPr>
-            <a:r>
-              <a:rPr lang="en-US" sz="1200" b="1" dirty="0">
-                <a:solidFill>
-                  <a:schemeClr val="bg2">
-                    <a:lumMod val="90000"/>
-                  </a:schemeClr>
-                </a:solidFill>
-                <a:latin typeface="Century Gothic" panose="020B0502020202020204" pitchFamily="34" charset="0"/>
-                <a:cs typeface="Arial" panose="020B0604020202020204" pitchFamily="34" charset="0"/>
-              </a:rPr>
-              <a:t>Winter Break</a:t>
-            </a:r>
-          </a:p>
-          <a:p>
-            <a:pPr>
-              <a:spcAft>
-                <a:spcPts val="200"/>
-              </a:spcAft>
-            </a:pPr>
-            <a:r>
-              <a:rPr lang="en-US" sz="1000" dirty="0">
-                <a:solidFill>
-                  <a:schemeClr val="bg2">
-                    <a:lumMod val="90000"/>
-                  </a:schemeClr>
-                </a:solidFill>
-                <a:latin typeface="Century Gothic" panose="020B0502020202020204" pitchFamily="34" charset="0"/>
-                <a:cs typeface="Arial" panose="020B0604020202020204" pitchFamily="34" charset="0"/>
-              </a:rPr>
-              <a:t>Dec 19-Jan 19, 2015</a:t>
-            </a:r>
-          </a:p>
-          <a:p>
-            <a:r>
-              <a:rPr lang="en-US" sz="800" i="1" dirty="0">
-                <a:solidFill>
-                  <a:schemeClr val="bg2">
-                    <a:lumMod val="90000"/>
-                  </a:schemeClr>
-                </a:solidFill>
-                <a:latin typeface="Century Gothic" panose="020B0502020202020204" pitchFamily="34" charset="0"/>
-                <a:cs typeface="Arial" panose="020B0604020202020204" pitchFamily="34" charset="0"/>
-              </a:rPr>
-              <a:t>Most students head home for the winter holidays, like Christmas and Hanukkah</a:t>
-            </a:r>
-          </a:p>
-        </p:txBody>
-      </p:sp>
-      <p:sp>
-        <p:nvSpPr>
-          <p:cNvPr id="66" name="TextBox 65"/>
-          <p:cNvSpPr txBox="1"/>
-          <p:nvPr/>
-        </p:nvSpPr>
-        <p:spPr>
-          <a:xfrm>
-            <a:off x="2023091" y="3516084"/>
-            <a:ext cx="1621523" cy="838691"/>
-          </a:xfrm>
-          <a:prstGeom prst="rect">
-            <a:avLst/>
-          </a:prstGeom>
-          <a:noFill/>
-        </p:spPr>
-        <p:txBody>
-          <a:bodyPr wrap="square" rtlCol="0">
-            <a:spAutoFit/>
-          </a:bodyPr>
-          <a:lstStyle/>
-          <a:p>
-            <a:pPr>
-              <a:spcAft>
-                <a:spcPts val="100"/>
-              </a:spcAft>
-            </a:pPr>
-            <a:r>
-              <a:rPr lang="en-US" sz="1200" b="1" dirty="0">
-                <a:solidFill>
-                  <a:schemeClr val="bg2">
-                    <a:lumMod val="90000"/>
-                  </a:schemeClr>
-                </a:solidFill>
-                <a:latin typeface="Century Gothic" panose="020B0502020202020204" pitchFamily="34" charset="0"/>
-                <a:cs typeface="Arial" panose="020B0604020202020204" pitchFamily="34" charset="0"/>
-              </a:rPr>
-              <a:t>Thanksgiving</a:t>
-            </a:r>
-          </a:p>
-          <a:p>
-            <a:pPr>
-              <a:spcAft>
-                <a:spcPts val="200"/>
-              </a:spcAft>
-            </a:pPr>
-            <a:r>
-              <a:rPr lang="en-US" sz="1000" dirty="0">
-                <a:solidFill>
-                  <a:schemeClr val="bg2">
-                    <a:lumMod val="90000"/>
-                  </a:schemeClr>
-                </a:solidFill>
-                <a:latin typeface="Century Gothic" panose="020B0502020202020204" pitchFamily="34" charset="0"/>
-                <a:cs typeface="Arial" panose="020B0604020202020204" pitchFamily="34" charset="0"/>
-              </a:rPr>
-              <a:t>Nov 26 2015</a:t>
-            </a:r>
-          </a:p>
-          <a:p>
-            <a:r>
-              <a:rPr lang="en-US" sz="800" i="1" dirty="0">
-                <a:solidFill>
-                  <a:schemeClr val="bg2">
-                    <a:lumMod val="90000"/>
-                  </a:schemeClr>
-                </a:solidFill>
-                <a:latin typeface="Century Gothic" panose="020B0502020202020204" pitchFamily="34" charset="0"/>
-                <a:cs typeface="Arial" panose="020B0604020202020204" pitchFamily="34" charset="0"/>
-              </a:rPr>
-              <a:t>Working out is optional when you’re filling up on turkey and mashed potatoes</a:t>
-            </a:r>
-          </a:p>
-        </p:txBody>
-      </p:sp>
-      <p:cxnSp>
-        <p:nvCxnSpPr>
-          <p:cNvPr id="67" name="Straight Arrow Connector 66"/>
-          <p:cNvCxnSpPr>
-            <a:cxnSpLocks/>
-          </p:cNvCxnSpPr>
-          <p:nvPr/>
-        </p:nvCxnSpPr>
-        <p:spPr>
-          <a:xfrm flipV="1">
-            <a:off x="3249384" y="3601809"/>
-            <a:ext cx="926306" cy="219076"/>
-          </a:xfrm>
-          <a:prstGeom prst="straightConnector1">
-            <a:avLst/>
-          </a:prstGeom>
-          <a:ln>
-            <a:solidFill>
-              <a:schemeClr val="bg2"/>
-            </a:solidFill>
-            <a:tailEnd type="triangle"/>
-          </a:ln>
-        </p:spPr>
-        <p:style>
-          <a:lnRef idx="1">
-            <a:schemeClr val="accent1"/>
-          </a:lnRef>
-          <a:fillRef idx="0">
-            <a:schemeClr val="accent1"/>
-          </a:fillRef>
-          <a:effectRef idx="0">
-            <a:schemeClr val="accent1"/>
-          </a:effectRef>
-          <a:fontRef idx="minor">
-            <a:schemeClr val="tx1"/>
-          </a:fontRef>
-        </p:style>
-      </p:cxnSp>
-      <p:sp>
-        <p:nvSpPr>
-          <p:cNvPr id="85" name="TextBox 84"/>
-          <p:cNvSpPr txBox="1"/>
-          <p:nvPr/>
-        </p:nvSpPr>
-        <p:spPr>
-          <a:xfrm>
-            <a:off x="3103334" y="1105594"/>
-            <a:ext cx="1481366" cy="715581"/>
-          </a:xfrm>
-          <a:prstGeom prst="rect">
-            <a:avLst/>
-          </a:prstGeom>
-          <a:noFill/>
         </p:spPr>
         <p:txBody>
           <a:bodyPr wrap="square" rtlCol="0">
@@ -8483,7 +9431,7 @@
     </p:spTree>
     <p:extLst>
       <p:ext uri="{BB962C8B-B14F-4D97-AF65-F5344CB8AC3E}">
-        <p14:creationId xmlns:p14="http://schemas.microsoft.com/office/powerpoint/2010/main" val="587154643"/>
+        <p14:creationId xmlns:p14="http://schemas.microsoft.com/office/powerpoint/2010/main" val="1840922421"/>
       </p:ext>
     </p:extLst>
   </p:cSld>
@@ -8584,9 +9532,6 @@
           <a:prstGeom prst="rect">
             <a:avLst/>
           </a:prstGeom>
-          <a:ln>
-            <a:noFill/>
-          </a:ln>
         </p:spPr>
       </p:pic>
       <p:sp>
@@ -8625,16 +9570,142 @@
           </a:p>
         </p:txBody>
       </p:sp>
-      <p:sp>
-        <p:nvSpPr>
-          <p:cNvPr id="54" name="TextBox 53"/>
+      <p:cxnSp>
+        <p:nvCxnSpPr>
+          <p:cNvPr id="61" name="Straight Arrow Connector 60"/>
+          <p:cNvCxnSpPr>
+            <a:cxnSpLocks/>
+          </p:cNvCxnSpPr>
+          <p:nvPr/>
+        </p:nvCxnSpPr>
+        <p:spPr>
+          <a:xfrm flipV="1">
+            <a:off x="4584700" y="4626041"/>
+            <a:ext cx="317272" cy="382366"/>
+          </a:xfrm>
+          <a:prstGeom prst="straightConnector1">
+            <a:avLst/>
+          </a:prstGeom>
+          <a:ln>
+            <a:tailEnd type="triangle"/>
+          </a:ln>
+        </p:spPr>
+        <p:style>
+          <a:lnRef idx="1">
+            <a:schemeClr val="accent1"/>
+          </a:lnRef>
+          <a:fillRef idx="0">
+            <a:schemeClr val="accent1"/>
+          </a:fillRef>
+          <a:effectRef idx="0">
+            <a:schemeClr val="accent1"/>
+          </a:effectRef>
+          <a:fontRef idx="minor">
+            <a:schemeClr val="tx1"/>
+          </a:fontRef>
+        </p:style>
+      </p:cxnSp>
+      <p:sp>
+        <p:nvSpPr>
+          <p:cNvPr id="64" name="TextBox 63"/>
           <p:cNvSpPr txBox="1"/>
           <p:nvPr/>
         </p:nvSpPr>
         <p:spPr>
           <a:xfrm>
-            <a:off x="6678270" y="1168985"/>
-            <a:ext cx="1994014" cy="851515"/>
+            <a:off x="968375" y="264531"/>
+            <a:ext cx="5178311" cy="461665"/>
+          </a:xfrm>
+          <a:prstGeom prst="rect">
+            <a:avLst/>
+          </a:prstGeom>
+          <a:noFill/>
+        </p:spPr>
+        <p:txBody>
+          <a:bodyPr wrap="square" rtlCol="0">
+            <a:spAutoFit/>
+          </a:bodyPr>
+          <a:lstStyle/>
+          <a:p>
+            <a:r>
+              <a:rPr lang="en-US" sz="2400" dirty="0">
+                <a:latin typeface="Futura-Normal" pitchFamily="2" charset="0"/>
+              </a:rPr>
+              <a:t>UC Berkeley 2015-16 Gym Attendance</a:t>
+            </a:r>
+          </a:p>
+        </p:txBody>
+      </p:sp>
+      <p:sp>
+        <p:nvSpPr>
+          <p:cNvPr id="65" name="TextBox 64"/>
+          <p:cNvSpPr txBox="1"/>
+          <p:nvPr/>
+        </p:nvSpPr>
+        <p:spPr>
+          <a:xfrm>
+            <a:off x="3539744" y="5008407"/>
+            <a:ext cx="1617448" cy="838691"/>
+          </a:xfrm>
+          <a:prstGeom prst="rect">
+            <a:avLst/>
+          </a:prstGeom>
+          <a:noFill/>
+        </p:spPr>
+        <p:txBody>
+          <a:bodyPr wrap="square" rtlCol="0">
+            <a:spAutoFit/>
+          </a:bodyPr>
+          <a:lstStyle/>
+          <a:p>
+            <a:pPr>
+              <a:spcAft>
+                <a:spcPts val="100"/>
+              </a:spcAft>
+            </a:pPr>
+            <a:r>
+              <a:rPr lang="en-US" sz="1200" b="1" dirty="0">
+                <a:latin typeface="Century Gothic" panose="020B0502020202020204" pitchFamily="34" charset="0"/>
+                <a:cs typeface="Arial" panose="020B0604020202020204" pitchFamily="34" charset="0"/>
+              </a:rPr>
+              <a:t>Winter Break</a:t>
+            </a:r>
+          </a:p>
+          <a:p>
+            <a:pPr>
+              <a:spcAft>
+                <a:spcPts val="200"/>
+              </a:spcAft>
+            </a:pPr>
+            <a:r>
+              <a:rPr lang="en-US" sz="1000" dirty="0">
+                <a:latin typeface="Century Gothic" panose="020B0502020202020204" pitchFamily="34" charset="0"/>
+                <a:cs typeface="Arial" panose="020B0604020202020204" pitchFamily="34" charset="0"/>
+              </a:rPr>
+              <a:t>Dec 19-Jan 19, 2015</a:t>
+            </a:r>
+          </a:p>
+          <a:p>
+            <a:r>
+              <a:rPr lang="en-US" sz="800" i="1" dirty="0">
+                <a:latin typeface="Century Gothic" panose="020B0502020202020204" pitchFamily="34" charset="0"/>
+                <a:cs typeface="Arial" panose="020B0604020202020204" pitchFamily="34" charset="0"/>
+              </a:rPr>
+              <a:t>Most students head home for the winter holidays, like Christmas and Hanukkah</a:t>
+            </a:r>
+          </a:p>
+        </p:txBody>
+      </p:sp>
+      <p:sp>
+        <p:nvSpPr>
+          <p:cNvPr id="66" name="TextBox 65"/>
+          <p:cNvSpPr txBox="1"/>
+          <p:nvPr/>
+        </p:nvSpPr>
+        <p:spPr>
+          <a:xfrm>
+            <a:off x="2023091" y="3516084"/>
+            <a:ext cx="1621523" cy="838691"/>
           </a:xfrm>
           <a:prstGeom prst="rect">
             <a:avLst/>
@@ -8662,7 +9733,7 @@
                 <a:latin typeface="Century Gothic" panose="020B0502020202020204" pitchFamily="34" charset="0"/>
                 <a:cs typeface="Arial" panose="020B0604020202020204" pitchFamily="34" charset="0"/>
               </a:rPr>
-              <a:t>New Year’s Gym Rush</a:t>
+              <a:t>Thanksgiving</a:t>
             </a:r>
           </a:p>
           <a:p>
@@ -8681,7 +9752,7 @@
                 <a:latin typeface="Century Gothic" panose="020B0502020202020204" pitchFamily="34" charset="0"/>
                 <a:cs typeface="Arial" panose="020B0604020202020204" pitchFamily="34" charset="0"/>
               </a:rPr>
-              <a:t>Jan 20, 2016</a:t>
+              <a:t>Nov 26 2015</a:t>
             </a:r>
           </a:p>
           <a:p>
@@ -8695,263 +9766,6 @@
                 <a:latin typeface="Century Gothic" panose="020B0502020202020204" pitchFamily="34" charset="0"/>
                 <a:cs typeface="Arial" panose="020B0604020202020204" pitchFamily="34" charset="0"/>
               </a:rPr>
-              <a:t>Students flood to the gym in a futile attempt to fulfill their New Year’s goals</a:t>
-            </a:r>
-          </a:p>
-        </p:txBody>
-      </p:sp>
-      <p:cxnSp>
-        <p:nvCxnSpPr>
-          <p:cNvPr id="60" name="Straight Arrow Connector 59"/>
-          <p:cNvCxnSpPr>
-            <a:cxnSpLocks/>
-          </p:cNvCxnSpPr>
-          <p:nvPr/>
-        </p:nvCxnSpPr>
-        <p:spPr>
-          <a:xfrm flipH="1">
-            <a:off x="5741759" y="1433497"/>
-            <a:ext cx="974611" cy="33724"/>
-          </a:xfrm>
-          <a:prstGeom prst="straightConnector1">
-            <a:avLst/>
-          </a:prstGeom>
-          <a:ln>
-            <a:solidFill>
-              <a:schemeClr val="bg2"/>
-            </a:solidFill>
-            <a:tailEnd type="triangle"/>
-          </a:ln>
-        </p:spPr>
-        <p:style>
-          <a:lnRef idx="1">
-            <a:schemeClr val="accent1"/>
-          </a:lnRef>
-          <a:fillRef idx="0">
-            <a:schemeClr val="accent1"/>
-          </a:fillRef>
-          <a:effectRef idx="0">
-            <a:schemeClr val="accent1"/>
-          </a:effectRef>
-          <a:fontRef idx="minor">
-            <a:schemeClr val="tx1"/>
-          </a:fontRef>
-        </p:style>
-      </p:cxnSp>
-      <p:cxnSp>
-        <p:nvCxnSpPr>
-          <p:cNvPr id="61" name="Straight Arrow Connector 60"/>
-          <p:cNvCxnSpPr>
-            <a:cxnSpLocks/>
-          </p:cNvCxnSpPr>
-          <p:nvPr/>
-        </p:nvCxnSpPr>
-        <p:spPr>
-          <a:xfrm flipV="1">
-            <a:off x="4584700" y="4626041"/>
-            <a:ext cx="317272" cy="382366"/>
-          </a:xfrm>
-          <a:prstGeom prst="straightConnector1">
-            <a:avLst/>
-          </a:prstGeom>
-          <a:ln>
-            <a:solidFill>
-              <a:schemeClr val="bg2"/>
-            </a:solidFill>
-            <a:tailEnd type="triangle"/>
-          </a:ln>
-        </p:spPr>
-        <p:style>
-          <a:lnRef idx="1">
-            <a:schemeClr val="accent1"/>
-          </a:lnRef>
-          <a:fillRef idx="0">
-            <a:schemeClr val="accent1"/>
-          </a:fillRef>
-          <a:effectRef idx="0">
-            <a:schemeClr val="accent1"/>
-          </a:effectRef>
-          <a:fontRef idx="minor">
-            <a:schemeClr val="tx1"/>
-          </a:fontRef>
-        </p:style>
-      </p:cxnSp>
-      <p:sp>
-        <p:nvSpPr>
-          <p:cNvPr id="64" name="TextBox 63"/>
-          <p:cNvSpPr txBox="1"/>
-          <p:nvPr/>
-        </p:nvSpPr>
-        <p:spPr>
-          <a:xfrm>
-            <a:off x="968375" y="264531"/>
-            <a:ext cx="5178311" cy="461665"/>
-          </a:xfrm>
-          <a:prstGeom prst="rect">
-            <a:avLst/>
-          </a:prstGeom>
-          <a:noFill/>
-        </p:spPr>
-        <p:txBody>
-          <a:bodyPr wrap="square" rtlCol="0">
-            <a:spAutoFit/>
-          </a:bodyPr>
-          <a:lstStyle/>
-          <a:p>
-            <a:r>
-              <a:rPr lang="en-US" sz="2400" dirty="0">
-                <a:latin typeface="Futura-Normal" pitchFamily="2" charset="0"/>
-              </a:rPr>
-              <a:t>UC Berkeley 2015-16 Gym Attendance</a:t>
-            </a:r>
-          </a:p>
-        </p:txBody>
-      </p:sp>
-      <p:sp>
-        <p:nvSpPr>
-          <p:cNvPr id="65" name="TextBox 64"/>
-          <p:cNvSpPr txBox="1"/>
-          <p:nvPr/>
-        </p:nvSpPr>
-        <p:spPr>
-          <a:xfrm>
-            <a:off x="3539744" y="5008407"/>
-            <a:ext cx="1617448" cy="838691"/>
-          </a:xfrm>
-          <a:prstGeom prst="rect">
-            <a:avLst/>
-          </a:prstGeom>
-          <a:noFill/>
-        </p:spPr>
-        <p:txBody>
-          <a:bodyPr wrap="square" rtlCol="0">
-            <a:spAutoFit/>
-          </a:bodyPr>
-          <a:lstStyle/>
-          <a:p>
-            <a:pPr>
-              <a:spcAft>
-                <a:spcPts val="100"/>
-              </a:spcAft>
-            </a:pPr>
-            <a:r>
-              <a:rPr lang="en-US" sz="1200" b="1" dirty="0">
-                <a:solidFill>
-                  <a:schemeClr val="bg2">
-                    <a:lumMod val="90000"/>
-                  </a:schemeClr>
-                </a:solidFill>
-                <a:latin typeface="Century Gothic" panose="020B0502020202020204" pitchFamily="34" charset="0"/>
-                <a:cs typeface="Arial" panose="020B0604020202020204" pitchFamily="34" charset="0"/>
-              </a:rPr>
-              <a:t>Winter Break</a:t>
-            </a:r>
-          </a:p>
-          <a:p>
-            <a:pPr>
-              <a:spcAft>
-                <a:spcPts val="200"/>
-              </a:spcAft>
-            </a:pPr>
-            <a:r>
-              <a:rPr lang="en-US" sz="1000" dirty="0">
-                <a:solidFill>
-                  <a:schemeClr val="bg2">
-                    <a:lumMod val="90000"/>
-                  </a:schemeClr>
-                </a:solidFill>
-                <a:latin typeface="Century Gothic" panose="020B0502020202020204" pitchFamily="34" charset="0"/>
-                <a:cs typeface="Arial" panose="020B0604020202020204" pitchFamily="34" charset="0"/>
-              </a:rPr>
-              <a:t>Dec 19-Jan 19, 2015</a:t>
-            </a:r>
-          </a:p>
-          <a:p>
-            <a:r>
-              <a:rPr lang="en-US" sz="800" i="1" dirty="0">
-                <a:solidFill>
-                  <a:schemeClr val="bg2">
-                    <a:lumMod val="90000"/>
-                  </a:schemeClr>
-                </a:solidFill>
-                <a:latin typeface="Century Gothic" panose="020B0502020202020204" pitchFamily="34" charset="0"/>
-                <a:cs typeface="Arial" panose="020B0604020202020204" pitchFamily="34" charset="0"/>
-              </a:rPr>
-              <a:t>Most students head home for the winter holidays, like Christmas and Hanukkah</a:t>
-            </a:r>
-          </a:p>
-        </p:txBody>
-      </p:sp>
-      <p:sp>
-        <p:nvSpPr>
-          <p:cNvPr id="66" name="TextBox 65"/>
-          <p:cNvSpPr txBox="1"/>
-          <p:nvPr/>
-        </p:nvSpPr>
-        <p:spPr>
-          <a:xfrm>
-            <a:off x="2023091" y="3516084"/>
-            <a:ext cx="1621523" cy="838691"/>
-          </a:xfrm>
-          <a:prstGeom prst="rect">
-            <a:avLst/>
-          </a:prstGeom>
-          <a:noFill/>
-        </p:spPr>
-        <p:txBody>
-          <a:bodyPr wrap="square" rtlCol="0">
-            <a:spAutoFit/>
-          </a:bodyPr>
-          <a:lstStyle/>
-          <a:p>
-            <a:pPr>
-              <a:spcAft>
-                <a:spcPts val="100"/>
-              </a:spcAft>
-            </a:pPr>
-            <a:r>
-              <a:rPr lang="en-US" sz="1200" b="1" dirty="0">
-                <a:solidFill>
-                  <a:schemeClr val="bg2">
-                    <a:lumMod val="90000"/>
-                  </a:schemeClr>
-                </a:solidFill>
-                <a:latin typeface="Century Gothic" panose="020B0502020202020204" pitchFamily="34" charset="0"/>
-                <a:cs typeface="Arial" panose="020B0604020202020204" pitchFamily="34" charset="0"/>
-              </a:rPr>
-              <a:t>Thanksgiving</a:t>
-            </a:r>
-          </a:p>
-          <a:p>
-            <a:pPr>
-              <a:spcAft>
-                <a:spcPts val="200"/>
-              </a:spcAft>
-            </a:pPr>
-            <a:r>
-              <a:rPr lang="en-US" sz="1000" dirty="0">
-                <a:solidFill>
-                  <a:schemeClr val="bg2">
-                    <a:lumMod val="90000"/>
-                  </a:schemeClr>
-                </a:solidFill>
-                <a:latin typeface="Century Gothic" panose="020B0502020202020204" pitchFamily="34" charset="0"/>
-                <a:cs typeface="Arial" panose="020B0604020202020204" pitchFamily="34" charset="0"/>
-              </a:rPr>
-              <a:t>Nov 26 2015</a:t>
-            </a:r>
-          </a:p>
-          <a:p>
-            <a:r>
-              <a:rPr lang="en-US" sz="800" i="1" dirty="0">
-                <a:solidFill>
-                  <a:schemeClr val="bg2">
-                    <a:lumMod val="90000"/>
-                  </a:schemeClr>
-                </a:solidFill>
-                <a:latin typeface="Century Gothic" panose="020B0502020202020204" pitchFamily="34" charset="0"/>
-                <a:cs typeface="Arial" panose="020B0604020202020204" pitchFamily="34" charset="0"/>
-              </a:rPr>
               <a:t>Working out is optional when you’re filling up on turkey and mashed potatoes</a:t>
             </a:r>
           </a:p>
@@ -8977,101 +9791,6 @@
             <a:solidFill>
               <a:schemeClr val="bg2"/>
             </a:solidFill>
-            <a:tailEnd type="triangle"/>
-          </a:ln>
-        </p:spPr>
-        <p:style>
-          <a:lnRef idx="1">
-            <a:schemeClr val="accent1"/>
-          </a:lnRef>
-          <a:fillRef idx="0">
-            <a:schemeClr val="accent1"/>
-          </a:fillRef>
-          <a:effectRef idx="0">
-            <a:schemeClr val="accent1"/>
-          </a:effectRef>
-          <a:fontRef idx="minor">
-            <a:schemeClr val="tx1"/>
-          </a:fontRef>
-        </p:style>
-      </p:cxnSp>
-      <p:sp>
-        <p:nvSpPr>
-          <p:cNvPr id="72" name="TextBox 71"/>
-          <p:cNvSpPr txBox="1"/>
-          <p:nvPr/>
-        </p:nvSpPr>
-        <p:spPr>
-          <a:xfrm>
-            <a:off x="5910722" y="5008407"/>
-            <a:ext cx="1535095" cy="592470"/>
-          </a:xfrm>
-          <a:prstGeom prst="rect">
-            <a:avLst/>
-          </a:prstGeom>
-          <a:noFill/>
-        </p:spPr>
-        <p:txBody>
-          <a:bodyPr wrap="square" rtlCol="0">
-            <a:spAutoFit/>
-          </a:bodyPr>
-          <a:lstStyle/>
-          <a:p>
-            <a:pPr>
-              <a:spcAft>
-                <a:spcPts val="100"/>
-              </a:spcAft>
-            </a:pPr>
-            <a:r>
-              <a:rPr lang="en-US" sz="1200" b="1" dirty="0">
-                <a:latin typeface="Century Gothic" panose="020B0502020202020204" pitchFamily="34" charset="0"/>
-                <a:cs typeface="Arial" panose="020B0604020202020204" pitchFamily="34" charset="0"/>
-              </a:rPr>
-              <a:t>Spring Break</a:t>
-            </a:r>
-          </a:p>
-          <a:p>
-            <a:pPr>
-              <a:spcAft>
-                <a:spcPts val="200"/>
-              </a:spcAft>
-            </a:pPr>
-            <a:r>
-              <a:rPr lang="en-US" sz="1000" dirty="0">
-                <a:latin typeface="Century Gothic" panose="020B0502020202020204" pitchFamily="34" charset="0"/>
-                <a:cs typeface="Arial" panose="020B0604020202020204" pitchFamily="34" charset="0"/>
-              </a:rPr>
-              <a:t>Mar 21-25, 2016</a:t>
-            </a:r>
-          </a:p>
-          <a:p>
-            <a:r>
-              <a:rPr lang="en-US" sz="800" i="1" dirty="0">
-                <a:latin typeface="Century Gothic" panose="020B0502020202020204" pitchFamily="34" charset="0"/>
-                <a:cs typeface="Arial" panose="020B0604020202020204" pitchFamily="34" charset="0"/>
-              </a:rPr>
-              <a:t>Spring break! Party! Woo!</a:t>
-            </a:r>
-          </a:p>
-        </p:txBody>
-      </p:sp>
-      <p:cxnSp>
-        <p:nvCxnSpPr>
-          <p:cNvPr id="80" name="Straight Arrow Connector 79"/>
-          <p:cNvCxnSpPr>
-            <a:cxnSpLocks/>
-          </p:cNvCxnSpPr>
-          <p:nvPr/>
-        </p:nvCxnSpPr>
-        <p:spPr>
-          <a:xfrm flipV="1">
-            <a:off x="6934200" y="4354775"/>
-            <a:ext cx="400050" cy="653632"/>
-          </a:xfrm>
-          <a:prstGeom prst="straightConnector1">
-            <a:avLst/>
-          </a:prstGeom>
-          <a:ln>
             <a:tailEnd type="triangle"/>
           </a:ln>
         </p:spPr>
@@ -9206,7 +9925,7 @@
     </p:spTree>
     <p:extLst>
       <p:ext uri="{BB962C8B-B14F-4D97-AF65-F5344CB8AC3E}">
-        <p14:creationId xmlns:p14="http://schemas.microsoft.com/office/powerpoint/2010/main" val="3065806878"/>
+        <p14:creationId xmlns:p14="http://schemas.microsoft.com/office/powerpoint/2010/main" val="2914679269"/>
       </p:ext>
     </p:extLst>
   </p:cSld>
@@ -9374,11 +10093,6 @@
             </a:pPr>
             <a:r>
               <a:rPr lang="en-US" sz="1200" b="1" dirty="0">
-                <a:solidFill>
-                  <a:schemeClr val="bg2">
-                    <a:lumMod val="90000"/>
-                  </a:schemeClr>
-                </a:solidFill>
                 <a:latin typeface="Century Gothic" panose="020B0502020202020204" pitchFamily="34" charset="0"/>
                 <a:cs typeface="Arial" panose="020B0604020202020204" pitchFamily="34" charset="0"/>
               </a:rPr>
@@ -9393,11 +10107,6 @@
             </a:pPr>
             <a:r>
               <a:rPr lang="en-US" sz="1000" dirty="0">
-                <a:solidFill>
-                  <a:schemeClr val="bg2">
-                    <a:lumMod val="90000"/>
-                  </a:schemeClr>
-                </a:solidFill>
                 <a:latin typeface="Century Gothic" panose="020B0502020202020204" pitchFamily="34" charset="0"/>
                 <a:cs typeface="Arial" panose="020B0604020202020204" pitchFamily="34" charset="0"/>
               </a:rPr>
@@ -9407,11 +10116,6 @@
           <a:p>
             <a:r>
               <a:rPr lang="en-US" sz="800" i="1" dirty="0">
-                <a:solidFill>
-                  <a:schemeClr val="bg2">
-                    <a:lumMod val="90000"/>
-                  </a:schemeClr>
-                </a:solidFill>
                 <a:latin typeface="Century Gothic" panose="020B0502020202020204" pitchFamily="34" charset="0"/>
                 <a:cs typeface="Arial" panose="020B0604020202020204" pitchFamily="34" charset="0"/>
               </a:rPr>
@@ -9437,9 +10141,6 @@
             <a:avLst/>
           </a:prstGeom>
           <a:ln>
-            <a:solidFill>
-              <a:schemeClr val="bg2"/>
-            </a:solidFill>
             <a:tailEnd type="triangle"/>
           </a:ln>
         </p:spPr>
@@ -9536,12 +10237,15 @@
         <p:spPr>
           <a:xfrm>
             <a:off x="3539744" y="5008407"/>
-            <a:ext cx="1617448" cy="715581"/>
+            <a:ext cx="1617448" cy="838691"/>
           </a:xfrm>
           <a:prstGeom prst="rect">
             <a:avLst/>
           </a:prstGeom>
           <a:noFill/>
+          <a:ln>
+            <a:noFill/>
+          </a:ln>
         </p:spPr>
         <p:txBody>
           <a:bodyPr wrap="square" rtlCol="0">
@@ -9597,7 +10301,7 @@
                 <a:latin typeface="Century Gothic" panose="020B0502020202020204" pitchFamily="34" charset="0"/>
                 <a:cs typeface="Arial" panose="020B0604020202020204" pitchFamily="34" charset="0"/>
               </a:rPr>
-              <a:t>Most students head home for the winter holidays</a:t>
+              <a:t>Most students head home for the winter holidays, like Christmas and Hanukkah</a:t>
             </a:r>
           </a:p>
         </p:txBody>
@@ -9611,7 +10315,7 @@
         <p:spPr>
           <a:xfrm>
             <a:off x="2023091" y="3516084"/>
-            <a:ext cx="1624984" cy="838691"/>
+            <a:ext cx="1621523" cy="838691"/>
           </a:xfrm>
           <a:prstGeom prst="rect">
             <a:avLst/>
@@ -9717,14 +10421,14 @@
       </p:cxnSp>
       <p:sp>
         <p:nvSpPr>
-          <p:cNvPr id="72" name="TextBox 71"/>
+          <p:cNvPr id="85" name="TextBox 84"/>
           <p:cNvSpPr txBox="1"/>
           <p:nvPr/>
         </p:nvSpPr>
         <p:spPr>
           <a:xfrm>
-            <a:off x="5910722" y="5008407"/>
-            <a:ext cx="1535095" cy="592470"/>
+            <a:off x="3103334" y="1105594"/>
+            <a:ext cx="1481366" cy="715581"/>
           </a:xfrm>
           <a:prstGeom prst="rect">
             <a:avLst/>
@@ -9752,7 +10456,7 @@
                 <a:latin typeface="Century Gothic" panose="020B0502020202020204" pitchFamily="34" charset="0"/>
                 <a:cs typeface="Arial" panose="020B0604020202020204" pitchFamily="34" charset="0"/>
               </a:rPr>
-              <a:t>Spring Break</a:t>
+              <a:t>School Begins</a:t>
             </a:r>
           </a:p>
           <a:p>
@@ -9771,7 +10475,7 @@
                 <a:latin typeface="Century Gothic" panose="020B0502020202020204" pitchFamily="34" charset="0"/>
                 <a:cs typeface="Arial" panose="020B0604020202020204" pitchFamily="34" charset="0"/>
               </a:rPr>
-              <a:t>Mar 21-25, 2016</a:t>
+              <a:t>Aug 26, 2016</a:t>
             </a:r>
           </a:p>
           <a:p>
@@ -9785,119 +10489,6 @@
                 <a:latin typeface="Century Gothic" panose="020B0502020202020204" pitchFamily="34" charset="0"/>
                 <a:cs typeface="Arial" panose="020B0604020202020204" pitchFamily="34" charset="0"/>
               </a:rPr>
-              <a:t>Spring break! Party! Woo!</a:t>
-            </a:r>
-          </a:p>
-        </p:txBody>
-      </p:sp>
-      <p:cxnSp>
-        <p:nvCxnSpPr>
-          <p:cNvPr id="80" name="Straight Arrow Connector 79"/>
-          <p:cNvCxnSpPr>
-            <a:cxnSpLocks/>
-          </p:cNvCxnSpPr>
-          <p:nvPr/>
-        </p:nvCxnSpPr>
-        <p:spPr>
-          <a:xfrm flipV="1">
-            <a:off x="6934200" y="4354775"/>
-            <a:ext cx="400050" cy="653632"/>
-          </a:xfrm>
-          <a:prstGeom prst="straightConnector1">
-            <a:avLst/>
-          </a:prstGeom>
-          <a:ln>
-            <a:solidFill>
-              <a:schemeClr val="bg2"/>
-            </a:solidFill>
-            <a:tailEnd type="triangle"/>
-          </a:ln>
-        </p:spPr>
-        <p:style>
-          <a:lnRef idx="1">
-            <a:schemeClr val="accent1"/>
-          </a:lnRef>
-          <a:fillRef idx="0">
-            <a:schemeClr val="accent1"/>
-          </a:fillRef>
-          <a:effectRef idx="0">
-            <a:schemeClr val="accent1"/>
-          </a:effectRef>
-          <a:fontRef idx="minor">
-            <a:schemeClr val="tx1"/>
-          </a:fontRef>
-        </p:style>
-      </p:cxnSp>
-      <p:sp>
-        <p:nvSpPr>
-          <p:cNvPr id="85" name="TextBox 84"/>
-          <p:cNvSpPr txBox="1"/>
-          <p:nvPr/>
-        </p:nvSpPr>
-        <p:spPr>
-          <a:xfrm>
-            <a:off x="3103334" y="1105594"/>
-            <a:ext cx="1481366" cy="715581"/>
-          </a:xfrm>
-          <a:prstGeom prst="rect">
-            <a:avLst/>
-          </a:prstGeom>
-          <a:noFill/>
-        </p:spPr>
-        <p:txBody>
-          <a:bodyPr wrap="square" rtlCol="0">
-            <a:spAutoFit/>
-          </a:bodyPr>
-          <a:lstStyle/>
-          <a:p>
-            <a:pPr>
-              <a:spcAft>
-                <a:spcPts val="100"/>
-              </a:spcAft>
-            </a:pPr>
-            <a:r>
-              <a:rPr lang="en-US" sz="1200" b="1" dirty="0">
-                <a:solidFill>
-                  <a:schemeClr val="bg2">
-                    <a:lumMod val="90000"/>
-                  </a:schemeClr>
-                </a:solidFill>
-                <a:latin typeface="Century Gothic" panose="020B0502020202020204" pitchFamily="34" charset="0"/>
-                <a:cs typeface="Arial" panose="020B0604020202020204" pitchFamily="34" charset="0"/>
-              </a:rPr>
-              <a:t>School Begins</a:t>
-            </a:r>
-          </a:p>
-          <a:p>
-            <a:pPr>
-              <a:spcAft>
-                <a:spcPts val="200"/>
-              </a:spcAft>
-            </a:pPr>
-            <a:r>
-              <a:rPr lang="en-US" sz="1000" dirty="0">
-                <a:solidFill>
-                  <a:schemeClr val="bg2">
-                    <a:lumMod val="90000"/>
-                  </a:schemeClr>
-                </a:solidFill>
-                <a:latin typeface="Century Gothic" panose="020B0502020202020204" pitchFamily="34" charset="0"/>
-                <a:cs typeface="Arial" panose="020B0604020202020204" pitchFamily="34" charset="0"/>
-              </a:rPr>
-              <a:t>Aug 26, 2016</a:t>
-            </a:r>
-          </a:p>
-          <a:p>
-            <a:r>
-              <a:rPr lang="en-US" sz="800" i="1" dirty="0">
-                <a:solidFill>
-                  <a:schemeClr val="bg2">
-                    <a:lumMod val="90000"/>
-                  </a:schemeClr>
-                </a:solidFill>
-                <a:latin typeface="Century Gothic" panose="020B0502020202020204" pitchFamily="34" charset="0"/>
-                <a:cs typeface="Arial" panose="020B0604020202020204" pitchFamily="34" charset="0"/>
-              </a:rPr>
               <a:t>Every freshman is in the gym until next week</a:t>
             </a:r>
           </a:p>
@@ -9923,101 +10514,6 @@
             <a:solidFill>
               <a:schemeClr val="bg2"/>
             </a:solidFill>
-            <a:tailEnd type="triangle"/>
-          </a:ln>
-        </p:spPr>
-        <p:style>
-          <a:lnRef idx="1">
-            <a:schemeClr val="accent1"/>
-          </a:lnRef>
-          <a:fillRef idx="0">
-            <a:schemeClr val="accent1"/>
-          </a:fillRef>
-          <a:effectRef idx="0">
-            <a:schemeClr val="accent1"/>
-          </a:effectRef>
-          <a:fontRef idx="minor">
-            <a:schemeClr val="tx1"/>
-          </a:fontRef>
-        </p:style>
-      </p:cxnSp>
-      <p:sp>
-        <p:nvSpPr>
-          <p:cNvPr id="89" name="TextBox 88"/>
-          <p:cNvSpPr txBox="1"/>
-          <p:nvPr/>
-        </p:nvSpPr>
-        <p:spPr>
-          <a:xfrm>
-            <a:off x="9412888" y="2724000"/>
-            <a:ext cx="2040969" cy="715581"/>
-          </a:xfrm>
-          <a:prstGeom prst="rect">
-            <a:avLst/>
-          </a:prstGeom>
-          <a:noFill/>
-        </p:spPr>
-        <p:txBody>
-          <a:bodyPr wrap="square" rtlCol="0">
-            <a:spAutoFit/>
-          </a:bodyPr>
-          <a:lstStyle/>
-          <a:p>
-            <a:pPr>
-              <a:spcAft>
-                <a:spcPts val="100"/>
-              </a:spcAft>
-            </a:pPr>
-            <a:r>
-              <a:rPr lang="en-US" sz="1200" b="1" dirty="0">
-                <a:latin typeface="Century Gothic" panose="020B0502020202020204" pitchFamily="34" charset="0"/>
-                <a:cs typeface="Arial" panose="020B0604020202020204" pitchFamily="34" charset="0"/>
-              </a:rPr>
-              <a:t>Spring Commencement</a:t>
-            </a:r>
-          </a:p>
-          <a:p>
-            <a:pPr>
-              <a:spcAft>
-                <a:spcPts val="200"/>
-              </a:spcAft>
-            </a:pPr>
-            <a:r>
-              <a:rPr lang="en-US" sz="1000" dirty="0">
-                <a:latin typeface="Century Gothic" panose="020B0502020202020204" pitchFamily="34" charset="0"/>
-                <a:cs typeface="Arial" panose="020B0604020202020204" pitchFamily="34" charset="0"/>
-              </a:rPr>
-              <a:t>May 14, 2016</a:t>
-            </a:r>
-          </a:p>
-          <a:p>
-            <a:r>
-              <a:rPr lang="en-US" sz="800" i="1" dirty="0">
-                <a:latin typeface="Century Gothic" panose="020B0502020202020204" pitchFamily="34" charset="0"/>
-                <a:cs typeface="Arial" panose="020B0604020202020204" pitchFamily="34" charset="0"/>
-              </a:rPr>
-              <a:t>The gym becomes an empty wasteland until next year</a:t>
-            </a:r>
-          </a:p>
-        </p:txBody>
-      </p:sp>
-      <p:cxnSp>
-        <p:nvCxnSpPr>
-          <p:cNvPr id="92" name="Straight Arrow Connector 91"/>
-          <p:cNvCxnSpPr>
-            <a:cxnSpLocks/>
-          </p:cNvCxnSpPr>
-          <p:nvPr/>
-        </p:nvCxnSpPr>
-        <p:spPr>
-          <a:xfrm flipH="1">
-            <a:off x="8976220" y="3429000"/>
-            <a:ext cx="510681" cy="773884"/>
-          </a:xfrm>
-          <a:prstGeom prst="straightConnector1">
-            <a:avLst/>
-          </a:prstGeom>
-          <a:ln>
             <a:tailEnd type="triangle"/>
           </a:ln>
         </p:spPr>
@@ -10039,7 +10535,7 @@
     </p:spTree>
     <p:extLst>
       <p:ext uri="{BB962C8B-B14F-4D97-AF65-F5344CB8AC3E}">
-        <p14:creationId xmlns:p14="http://schemas.microsoft.com/office/powerpoint/2010/main" val="3988067614"/>
+        <p14:creationId xmlns:p14="http://schemas.microsoft.com/office/powerpoint/2010/main" val="587154643"/>
       </p:ext>
     </p:extLst>
   </p:cSld>

</xml_diff>